<commit_message>
final draft of project
</commit_message>
<xml_diff>
--- a/1-web-scraping/Web Scraping Project.pptx
+++ b/1-web-scraping/Web Scraping Project.pptx
@@ -1,21 +1,25 @@
 
 <file path=ppt/presentation.xml><?xml version="1.0" encoding="utf-8"?>
-<p:presentation xmlns:a="http://schemas.openxmlformats.org/drawingml/2006/main" xmlns:r="http://schemas.openxmlformats.org/officeDocument/2006/relationships" xmlns:p="http://schemas.openxmlformats.org/presentationml/2006/main" saveSubsetFonts="1">
+<p:presentation xmlns:a="http://schemas.openxmlformats.org/drawingml/2006/main" xmlns:r="http://schemas.openxmlformats.org/officeDocument/2006/relationships" xmlns:p="http://schemas.openxmlformats.org/presentationml/2006/main" showSpecialPlsOnTitleSld="0" saveSubsetFonts="1">
   <p:sldMasterIdLst>
-    <p:sldMasterId id="2147483648" r:id="rId1"/>
+    <p:sldMasterId id="2147483699" r:id="rId1"/>
   </p:sldMasterIdLst>
+  <p:notesMasterIdLst>
+    <p:notesMasterId r:id="rId14"/>
+  </p:notesMasterIdLst>
   <p:sldIdLst>
     <p:sldId id="256" r:id="rId2"/>
     <p:sldId id="261" r:id="rId3"/>
     <p:sldId id="257" r:id="rId4"/>
-    <p:sldId id="263" r:id="rId5"/>
-    <p:sldId id="264" r:id="rId6"/>
-    <p:sldId id="266" r:id="rId7"/>
-    <p:sldId id="262" r:id="rId8"/>
-    <p:sldId id="267" r:id="rId9"/>
-    <p:sldId id="258" r:id="rId10"/>
+    <p:sldId id="269" r:id="rId5"/>
+    <p:sldId id="263" r:id="rId6"/>
+    <p:sldId id="270" r:id="rId7"/>
+    <p:sldId id="264" r:id="rId8"/>
+    <p:sldId id="266" r:id="rId9"/>
+    <p:sldId id="271" r:id="rId10"/>
     <p:sldId id="259" r:id="rId11"/>
-    <p:sldId id="260" r:id="rId12"/>
+    <p:sldId id="262" r:id="rId12"/>
+    <p:sldId id="267" r:id="rId13"/>
   </p:sldIdLst>
   <p:sldSz cx="12192000" cy="6858000"/>
   <p:notesSz cx="6858000" cy="9144000"/>
@@ -114,7 +118,446 @@
       </a:defRPr>
     </a:lvl9pPr>
   </p:defaultTextStyle>
+  <p:extLst>
+    <p:ext uri="{EFAFB233-063F-42B5-8137-9DF3F51BA10A}">
+      <p15:sldGuideLst xmlns:p15="http://schemas.microsoft.com/office/powerpoint/2012/main"/>
+    </p:ext>
+  </p:extLst>
 </p:presentation>
+</file>
+
+<file path=ppt/notesMasters/notesMaster1.xml><?xml version="1.0" encoding="utf-8"?>
+<p:notesMaster xmlns:a="http://schemas.openxmlformats.org/drawingml/2006/main" xmlns:r="http://schemas.openxmlformats.org/officeDocument/2006/relationships" xmlns:p="http://schemas.openxmlformats.org/presentationml/2006/main">
+  <p:cSld>
+    <p:bg>
+      <p:bgRef idx="1001">
+        <a:schemeClr val="bg1"/>
+      </p:bgRef>
+    </p:bg>
+    <p:spTree>
+      <p:nvGrpSpPr>
+        <p:cNvPr id="1" name=""/>
+        <p:cNvGrpSpPr/>
+        <p:nvPr/>
+      </p:nvGrpSpPr>
+      <p:grpSpPr>
+        <a:xfrm>
+          <a:off x="0" y="0"/>
+          <a:ext cx="0" cy="0"/>
+          <a:chOff x="0" y="0"/>
+          <a:chExt cx="0" cy="0"/>
+        </a:xfrm>
+      </p:grpSpPr>
+      <p:sp>
+        <p:nvSpPr>
+          <p:cNvPr id="2" name="Header Placeholder 1"/>
+          <p:cNvSpPr>
+            <a:spLocks noGrp="1"/>
+          </p:cNvSpPr>
+          <p:nvPr>
+            <p:ph type="hdr" sz="quarter"/>
+          </p:nvPr>
+        </p:nvSpPr>
+        <p:spPr>
+          <a:xfrm>
+            <a:off x="0" y="0"/>
+            <a:ext cx="2971800" cy="458788"/>
+          </a:xfrm>
+          <a:prstGeom prst="rect">
+            <a:avLst/>
+          </a:prstGeom>
+        </p:spPr>
+        <p:txBody>
+          <a:bodyPr vert="horz" lIns="91440" tIns="45720" rIns="91440" bIns="45720" rtlCol="0"/>
+          <a:lstStyle>
+            <a:lvl1pPr algn="l">
+              <a:defRPr sz="1200"/>
+            </a:lvl1pPr>
+          </a:lstStyle>
+          <a:p>
+            <a:endParaRPr lang="en-US"/>
+          </a:p>
+        </p:txBody>
+      </p:sp>
+      <p:sp>
+        <p:nvSpPr>
+          <p:cNvPr id="3" name="Date Placeholder 2"/>
+          <p:cNvSpPr>
+            <a:spLocks noGrp="1"/>
+          </p:cNvSpPr>
+          <p:nvPr>
+            <p:ph type="dt" idx="1"/>
+          </p:nvPr>
+        </p:nvSpPr>
+        <p:spPr>
+          <a:xfrm>
+            <a:off x="3884613" y="0"/>
+            <a:ext cx="2971800" cy="458788"/>
+          </a:xfrm>
+          <a:prstGeom prst="rect">
+            <a:avLst/>
+          </a:prstGeom>
+        </p:spPr>
+        <p:txBody>
+          <a:bodyPr vert="horz" lIns="91440" tIns="45720" rIns="91440" bIns="45720" rtlCol="0"/>
+          <a:lstStyle>
+            <a:lvl1pPr algn="r">
+              <a:defRPr sz="1200"/>
+            </a:lvl1pPr>
+          </a:lstStyle>
+          <a:p>
+            <a:fld id="{B9B81A66-072D-44AF-AAC0-A53B0CDA7EB3}" type="datetimeFigureOut">
+              <a:rPr lang="en-US" smtClean="0"/>
+              <a:t>7/26/2020</a:t>
+            </a:fld>
+            <a:endParaRPr lang="en-US"/>
+          </a:p>
+        </p:txBody>
+      </p:sp>
+      <p:sp>
+        <p:nvSpPr>
+          <p:cNvPr id="4" name="Slide Image Placeholder 3"/>
+          <p:cNvSpPr>
+            <a:spLocks noGrp="1" noRot="1" noChangeAspect="1"/>
+          </p:cNvSpPr>
+          <p:nvPr>
+            <p:ph type="sldImg" idx="2"/>
+          </p:nvPr>
+        </p:nvSpPr>
+        <p:spPr>
+          <a:xfrm>
+            <a:off x="685800" y="1143000"/>
+            <a:ext cx="5486400" cy="3086100"/>
+          </a:xfrm>
+          <a:prstGeom prst="rect">
+            <a:avLst/>
+          </a:prstGeom>
+          <a:noFill/>
+          <a:ln w="12700">
+            <a:solidFill>
+              <a:prstClr val="black"/>
+            </a:solidFill>
+          </a:ln>
+        </p:spPr>
+        <p:txBody>
+          <a:bodyPr vert="horz" lIns="91440" tIns="45720" rIns="91440" bIns="45720" rtlCol="0" anchor="ctr"/>
+          <a:lstStyle/>
+          <a:p>
+            <a:endParaRPr lang="en-US"/>
+          </a:p>
+        </p:txBody>
+      </p:sp>
+      <p:sp>
+        <p:nvSpPr>
+          <p:cNvPr id="5" name="Notes Placeholder 4"/>
+          <p:cNvSpPr>
+            <a:spLocks noGrp="1"/>
+          </p:cNvSpPr>
+          <p:nvPr>
+            <p:ph type="body" sz="quarter" idx="3"/>
+          </p:nvPr>
+        </p:nvSpPr>
+        <p:spPr>
+          <a:xfrm>
+            <a:off x="685800" y="4400550"/>
+            <a:ext cx="5486400" cy="3600450"/>
+          </a:xfrm>
+          <a:prstGeom prst="rect">
+            <a:avLst/>
+          </a:prstGeom>
+        </p:spPr>
+        <p:txBody>
+          <a:bodyPr vert="horz" lIns="91440" tIns="45720" rIns="91440" bIns="45720" rtlCol="0"/>
+          <a:lstStyle/>
+          <a:p>
+            <a:pPr lvl="0"/>
+            <a:r>
+              <a:rPr lang="en-US" smtClean="0"/>
+              <a:t>Click to edit Master text styles</a:t>
+            </a:r>
+          </a:p>
+          <a:p>
+            <a:pPr lvl="1"/>
+            <a:r>
+              <a:rPr lang="en-US" smtClean="0"/>
+              <a:t>Second level</a:t>
+            </a:r>
+          </a:p>
+          <a:p>
+            <a:pPr lvl="2"/>
+            <a:r>
+              <a:rPr lang="en-US" smtClean="0"/>
+              <a:t>Third level</a:t>
+            </a:r>
+          </a:p>
+          <a:p>
+            <a:pPr lvl="3"/>
+            <a:r>
+              <a:rPr lang="en-US" smtClean="0"/>
+              <a:t>Fourth level</a:t>
+            </a:r>
+          </a:p>
+          <a:p>
+            <a:pPr lvl="4"/>
+            <a:r>
+              <a:rPr lang="en-US" smtClean="0"/>
+              <a:t>Fifth level</a:t>
+            </a:r>
+            <a:endParaRPr lang="en-US"/>
+          </a:p>
+        </p:txBody>
+      </p:sp>
+      <p:sp>
+        <p:nvSpPr>
+          <p:cNvPr id="6" name="Footer Placeholder 5"/>
+          <p:cNvSpPr>
+            <a:spLocks noGrp="1"/>
+          </p:cNvSpPr>
+          <p:nvPr>
+            <p:ph type="ftr" sz="quarter" idx="4"/>
+          </p:nvPr>
+        </p:nvSpPr>
+        <p:spPr>
+          <a:xfrm>
+            <a:off x="0" y="8685213"/>
+            <a:ext cx="2971800" cy="458787"/>
+          </a:xfrm>
+          <a:prstGeom prst="rect">
+            <a:avLst/>
+          </a:prstGeom>
+        </p:spPr>
+        <p:txBody>
+          <a:bodyPr vert="horz" lIns="91440" tIns="45720" rIns="91440" bIns="45720" rtlCol="0" anchor="b"/>
+          <a:lstStyle>
+            <a:lvl1pPr algn="l">
+              <a:defRPr sz="1200"/>
+            </a:lvl1pPr>
+          </a:lstStyle>
+          <a:p>
+            <a:endParaRPr lang="en-US"/>
+          </a:p>
+        </p:txBody>
+      </p:sp>
+      <p:sp>
+        <p:nvSpPr>
+          <p:cNvPr id="7" name="Slide Number Placeholder 6"/>
+          <p:cNvSpPr>
+            <a:spLocks noGrp="1"/>
+          </p:cNvSpPr>
+          <p:nvPr>
+            <p:ph type="sldNum" sz="quarter" idx="5"/>
+          </p:nvPr>
+        </p:nvSpPr>
+        <p:spPr>
+          <a:xfrm>
+            <a:off x="3884613" y="8685213"/>
+            <a:ext cx="2971800" cy="458787"/>
+          </a:xfrm>
+          <a:prstGeom prst="rect">
+            <a:avLst/>
+          </a:prstGeom>
+        </p:spPr>
+        <p:txBody>
+          <a:bodyPr vert="horz" lIns="91440" tIns="45720" rIns="91440" bIns="45720" rtlCol="0" anchor="b"/>
+          <a:lstStyle>
+            <a:lvl1pPr algn="r">
+              <a:defRPr sz="1200"/>
+            </a:lvl1pPr>
+          </a:lstStyle>
+          <a:p>
+            <a:fld id="{32AACB1A-97A4-4B00-A5A6-6C5014B44934}" type="slidenum">
+              <a:rPr lang="en-US" smtClean="0"/>
+              <a:t>‹#›</a:t>
+            </a:fld>
+            <a:endParaRPr lang="en-US"/>
+          </a:p>
+        </p:txBody>
+      </p:sp>
+    </p:spTree>
+    <p:extLst>
+      <p:ext uri="{BB962C8B-B14F-4D97-AF65-F5344CB8AC3E}">
+        <p14:creationId xmlns:p14="http://schemas.microsoft.com/office/powerpoint/2010/main" val="4050758211"/>
+      </p:ext>
+    </p:extLst>
+  </p:cSld>
+  <p:clrMap bg1="lt1" tx1="dk1" bg2="lt2" tx2="dk2" accent1="accent1" accent2="accent2" accent3="accent3" accent4="accent4" accent5="accent5" accent6="accent6" hlink="hlink" folHlink="folHlink"/>
+  <p:notesStyle>
+    <a:lvl1pPr marL="0" algn="l" defTabSz="914400" rtl="0" eaLnBrk="1" latinLnBrk="0" hangingPunct="1">
+      <a:defRPr sz="1200" kern="1200">
+        <a:solidFill>
+          <a:schemeClr val="tx1"/>
+        </a:solidFill>
+        <a:latin typeface="+mn-lt"/>
+        <a:ea typeface="+mn-ea"/>
+        <a:cs typeface="+mn-cs"/>
+      </a:defRPr>
+    </a:lvl1pPr>
+    <a:lvl2pPr marL="457200" algn="l" defTabSz="914400" rtl="0" eaLnBrk="1" latinLnBrk="0" hangingPunct="1">
+      <a:defRPr sz="1200" kern="1200">
+        <a:solidFill>
+          <a:schemeClr val="tx1"/>
+        </a:solidFill>
+        <a:latin typeface="+mn-lt"/>
+        <a:ea typeface="+mn-ea"/>
+        <a:cs typeface="+mn-cs"/>
+      </a:defRPr>
+    </a:lvl2pPr>
+    <a:lvl3pPr marL="914400" algn="l" defTabSz="914400" rtl="0" eaLnBrk="1" latinLnBrk="0" hangingPunct="1">
+      <a:defRPr sz="1200" kern="1200">
+        <a:solidFill>
+          <a:schemeClr val="tx1"/>
+        </a:solidFill>
+        <a:latin typeface="+mn-lt"/>
+        <a:ea typeface="+mn-ea"/>
+        <a:cs typeface="+mn-cs"/>
+      </a:defRPr>
+    </a:lvl3pPr>
+    <a:lvl4pPr marL="1371600" algn="l" defTabSz="914400" rtl="0" eaLnBrk="1" latinLnBrk="0" hangingPunct="1">
+      <a:defRPr sz="1200" kern="1200">
+        <a:solidFill>
+          <a:schemeClr val="tx1"/>
+        </a:solidFill>
+        <a:latin typeface="+mn-lt"/>
+        <a:ea typeface="+mn-ea"/>
+        <a:cs typeface="+mn-cs"/>
+      </a:defRPr>
+    </a:lvl4pPr>
+    <a:lvl5pPr marL="1828800" algn="l" defTabSz="914400" rtl="0" eaLnBrk="1" latinLnBrk="0" hangingPunct="1">
+      <a:defRPr sz="1200" kern="1200">
+        <a:solidFill>
+          <a:schemeClr val="tx1"/>
+        </a:solidFill>
+        <a:latin typeface="+mn-lt"/>
+        <a:ea typeface="+mn-ea"/>
+        <a:cs typeface="+mn-cs"/>
+      </a:defRPr>
+    </a:lvl5pPr>
+    <a:lvl6pPr marL="2286000" algn="l" defTabSz="914400" rtl="0" eaLnBrk="1" latinLnBrk="0" hangingPunct="1">
+      <a:defRPr sz="1200" kern="1200">
+        <a:solidFill>
+          <a:schemeClr val="tx1"/>
+        </a:solidFill>
+        <a:latin typeface="+mn-lt"/>
+        <a:ea typeface="+mn-ea"/>
+        <a:cs typeface="+mn-cs"/>
+      </a:defRPr>
+    </a:lvl6pPr>
+    <a:lvl7pPr marL="2743200" algn="l" defTabSz="914400" rtl="0" eaLnBrk="1" latinLnBrk="0" hangingPunct="1">
+      <a:defRPr sz="1200" kern="1200">
+        <a:solidFill>
+          <a:schemeClr val="tx1"/>
+        </a:solidFill>
+        <a:latin typeface="+mn-lt"/>
+        <a:ea typeface="+mn-ea"/>
+        <a:cs typeface="+mn-cs"/>
+      </a:defRPr>
+    </a:lvl7pPr>
+    <a:lvl8pPr marL="3200400" algn="l" defTabSz="914400" rtl="0" eaLnBrk="1" latinLnBrk="0" hangingPunct="1">
+      <a:defRPr sz="1200" kern="1200">
+        <a:solidFill>
+          <a:schemeClr val="tx1"/>
+        </a:solidFill>
+        <a:latin typeface="+mn-lt"/>
+        <a:ea typeface="+mn-ea"/>
+        <a:cs typeface="+mn-cs"/>
+      </a:defRPr>
+    </a:lvl8pPr>
+    <a:lvl9pPr marL="3657600" algn="l" defTabSz="914400" rtl="0" eaLnBrk="1" latinLnBrk="0" hangingPunct="1">
+      <a:defRPr sz="1200" kern="1200">
+        <a:solidFill>
+          <a:schemeClr val="tx1"/>
+        </a:solidFill>
+        <a:latin typeface="+mn-lt"/>
+        <a:ea typeface="+mn-ea"/>
+        <a:cs typeface="+mn-cs"/>
+      </a:defRPr>
+    </a:lvl9pPr>
+  </p:notesStyle>
+</p:notesMaster>
+</file>
+
+<file path=ppt/notesSlides/notesSlide1.xml><?xml version="1.0" encoding="utf-8"?>
+<p:notes xmlns:a="http://schemas.openxmlformats.org/drawingml/2006/main" xmlns:r="http://schemas.openxmlformats.org/officeDocument/2006/relationships" xmlns:p="http://schemas.openxmlformats.org/presentationml/2006/main">
+  <p:cSld>
+    <p:spTree>
+      <p:nvGrpSpPr>
+        <p:cNvPr id="1" name=""/>
+        <p:cNvGrpSpPr/>
+        <p:nvPr/>
+      </p:nvGrpSpPr>
+      <p:grpSpPr>
+        <a:xfrm>
+          <a:off x="0" y="0"/>
+          <a:ext cx="0" cy="0"/>
+          <a:chOff x="0" y="0"/>
+          <a:chExt cx="0" cy="0"/>
+        </a:xfrm>
+      </p:grpSpPr>
+      <p:sp>
+        <p:nvSpPr>
+          <p:cNvPr id="2" name="Slide Image Placeholder 1"/>
+          <p:cNvSpPr>
+            <a:spLocks noGrp="1" noRot="1" noChangeAspect="1"/>
+          </p:cNvSpPr>
+          <p:nvPr>
+            <p:ph type="sldImg"/>
+          </p:nvPr>
+        </p:nvSpPr>
+        <p:spPr/>
+      </p:sp>
+      <p:sp>
+        <p:nvSpPr>
+          <p:cNvPr id="3" name="Notes Placeholder 2"/>
+          <p:cNvSpPr>
+            <a:spLocks noGrp="1"/>
+          </p:cNvSpPr>
+          <p:nvPr>
+            <p:ph type="body" idx="1"/>
+          </p:nvPr>
+        </p:nvSpPr>
+        <p:spPr/>
+        <p:txBody>
+          <a:bodyPr/>
+          <a:lstStyle/>
+          <a:p>
+            <a:endParaRPr lang="en-US"/>
+          </a:p>
+        </p:txBody>
+      </p:sp>
+      <p:sp>
+        <p:nvSpPr>
+          <p:cNvPr id="4" name="Slide Number Placeholder 3"/>
+          <p:cNvSpPr>
+            <a:spLocks noGrp="1"/>
+          </p:cNvSpPr>
+          <p:nvPr>
+            <p:ph type="sldNum" sz="quarter" idx="10"/>
+          </p:nvPr>
+        </p:nvSpPr>
+        <p:spPr/>
+        <p:txBody>
+          <a:bodyPr/>
+          <a:lstStyle/>
+          <a:p>
+            <a:fld id="{32AACB1A-97A4-4B00-A5A6-6C5014B44934}" type="slidenum">
+              <a:rPr lang="en-US" smtClean="0"/>
+              <a:t>1</a:t>
+            </a:fld>
+            <a:endParaRPr lang="en-US"/>
+          </a:p>
+        </p:txBody>
+      </p:sp>
+    </p:spTree>
+    <p:extLst>
+      <p:ext uri="{BB962C8B-B14F-4D97-AF65-F5344CB8AC3E}">
+        <p14:creationId xmlns:p14="http://schemas.microsoft.com/office/powerpoint/2010/main" val="869108716"/>
+      </p:ext>
+    </p:extLst>
+  </p:cSld>
+  <p:clrMapOvr>
+    <a:masterClrMapping/>
+  </p:clrMapOvr>
+</p:notes>
 </file>
 
 <file path=ppt/slideLayouts/slideLayout1.xml><?xml version="1.0" encoding="utf-8"?>
@@ -246,9 +689,9 @@
           <a:bodyPr/>
           <a:lstStyle/>
           <a:p>
-            <a:fld id="{B1DD09B4-EBC7-4C7C-B5F4-0DB339DE71B3}" type="datetimeFigureOut">
-              <a:rPr lang="en-US" smtClean="0"/>
-              <a:t>7/24/2020</a:t>
+            <a:fld id="{1A4DC1D4-8F4C-4871-A2F6-2E54397244A8}" type="datetime1">
+              <a:rPr lang="en-US" smtClean="0"/>
+              <a:t>7/26/2020</a:t>
             </a:fld>
             <a:endParaRPr lang="en-US"/>
           </a:p>
@@ -299,13 +742,20 @@
     </p:spTree>
     <p:extLst>
       <p:ext uri="{BB962C8B-B14F-4D97-AF65-F5344CB8AC3E}">
-        <p14:creationId xmlns:p14="http://schemas.microsoft.com/office/powerpoint/2010/main" val="1589117054"/>
+        <p14:creationId xmlns:p14="http://schemas.microsoft.com/office/powerpoint/2010/main" val="2603501521"/>
       </p:ext>
     </p:extLst>
   </p:cSld>
   <p:clrMapOvr>
     <a:masterClrMapping/>
   </p:clrMapOvr>
+  <p:timing>
+    <p:tnLst>
+      <p:par>
+        <p:cTn id="1" dur="indefinite" restart="never" nodeType="tmRoot"/>
+      </p:par>
+    </p:tnLst>
+  </p:timing>
 </p:sldLayout>
 </file>
 
@@ -416,9 +866,9 @@
           <a:bodyPr/>
           <a:lstStyle/>
           <a:p>
-            <a:fld id="{B1DD09B4-EBC7-4C7C-B5F4-0DB339DE71B3}" type="datetimeFigureOut">
-              <a:rPr lang="en-US" smtClean="0"/>
-              <a:t>7/24/2020</a:t>
+            <a:fld id="{6395F726-9BDE-45D0-A87F-F10E441A135C}" type="datetime1">
+              <a:rPr lang="en-US" smtClean="0"/>
+              <a:t>7/26/2020</a:t>
             </a:fld>
             <a:endParaRPr lang="en-US"/>
           </a:p>
@@ -469,7 +919,7 @@
     </p:spTree>
     <p:extLst>
       <p:ext uri="{BB962C8B-B14F-4D97-AF65-F5344CB8AC3E}">
-        <p14:creationId xmlns:p14="http://schemas.microsoft.com/office/powerpoint/2010/main" val="1953658000"/>
+        <p14:creationId xmlns:p14="http://schemas.microsoft.com/office/powerpoint/2010/main" val="807292347"/>
       </p:ext>
     </p:extLst>
   </p:cSld>
@@ -596,9 +1046,9 @@
           <a:bodyPr/>
           <a:lstStyle/>
           <a:p>
-            <a:fld id="{B1DD09B4-EBC7-4C7C-B5F4-0DB339DE71B3}" type="datetimeFigureOut">
-              <a:rPr lang="en-US" smtClean="0"/>
-              <a:t>7/24/2020</a:t>
+            <a:fld id="{281EE617-F344-46C1-ABD2-2F97B1BBC997}" type="datetime1">
+              <a:rPr lang="en-US" smtClean="0"/>
+              <a:t>7/26/2020</a:t>
             </a:fld>
             <a:endParaRPr lang="en-US"/>
           </a:p>
@@ -649,7 +1099,7 @@
     </p:spTree>
     <p:extLst>
       <p:ext uri="{BB962C8B-B14F-4D97-AF65-F5344CB8AC3E}">
-        <p14:creationId xmlns:p14="http://schemas.microsoft.com/office/powerpoint/2010/main" val="1637006355"/>
+        <p14:creationId xmlns:p14="http://schemas.microsoft.com/office/powerpoint/2010/main" val="2892236989"/>
       </p:ext>
     </p:extLst>
   </p:cSld>
@@ -766,9 +1216,9 @@
           <a:bodyPr/>
           <a:lstStyle/>
           <a:p>
-            <a:fld id="{B1DD09B4-EBC7-4C7C-B5F4-0DB339DE71B3}" type="datetimeFigureOut">
-              <a:rPr lang="en-US" smtClean="0"/>
-              <a:t>7/24/2020</a:t>
+            <a:fld id="{90A04284-0CC0-4B7F-8B66-7E5EB0581B07}" type="datetime1">
+              <a:rPr lang="en-US" smtClean="0"/>
+              <a:t>7/26/2020</a:t>
             </a:fld>
             <a:endParaRPr lang="en-US"/>
           </a:p>
@@ -819,13 +1269,20 @@
     </p:spTree>
     <p:extLst>
       <p:ext uri="{BB962C8B-B14F-4D97-AF65-F5344CB8AC3E}">
-        <p14:creationId xmlns:p14="http://schemas.microsoft.com/office/powerpoint/2010/main" val="813244202"/>
+        <p14:creationId xmlns:p14="http://schemas.microsoft.com/office/powerpoint/2010/main" val="628617216"/>
       </p:ext>
     </p:extLst>
   </p:cSld>
   <p:clrMapOvr>
     <a:masterClrMapping/>
   </p:clrMapOvr>
+  <p:timing>
+    <p:tnLst>
+      <p:par>
+        <p:cTn id="1" dur="indefinite" restart="never" nodeType="tmRoot"/>
+      </p:par>
+    </p:tnLst>
+  </p:timing>
 </p:sldLayout>
 </file>
 
@@ -1012,9 +1469,9 @@
           <a:bodyPr/>
           <a:lstStyle/>
           <a:p>
-            <a:fld id="{B1DD09B4-EBC7-4C7C-B5F4-0DB339DE71B3}" type="datetimeFigureOut">
-              <a:rPr lang="en-US" smtClean="0"/>
-              <a:t>7/24/2020</a:t>
+            <a:fld id="{AF9B3ADF-F027-4972-8B05-CC20FCB7FD88}" type="datetime1">
+              <a:rPr lang="en-US" smtClean="0"/>
+              <a:t>7/26/2020</a:t>
             </a:fld>
             <a:endParaRPr lang="en-US"/>
           </a:p>
@@ -1065,7 +1522,7 @@
     </p:spTree>
     <p:extLst>
       <p:ext uri="{BB962C8B-B14F-4D97-AF65-F5344CB8AC3E}">
-        <p14:creationId xmlns:p14="http://schemas.microsoft.com/office/powerpoint/2010/main" val="503043936"/>
+        <p14:creationId xmlns:p14="http://schemas.microsoft.com/office/powerpoint/2010/main" val="2763935928"/>
       </p:ext>
     </p:extLst>
   </p:cSld>
@@ -1244,9 +1701,9 @@
           <a:bodyPr/>
           <a:lstStyle/>
           <a:p>
-            <a:fld id="{B1DD09B4-EBC7-4C7C-B5F4-0DB339DE71B3}" type="datetimeFigureOut">
-              <a:rPr lang="en-US" smtClean="0"/>
-              <a:t>7/24/2020</a:t>
+            <a:fld id="{58354E25-57CB-42F3-8CAD-A801D812F267}" type="datetime1">
+              <a:rPr lang="en-US" smtClean="0"/>
+              <a:t>7/26/2020</a:t>
             </a:fld>
             <a:endParaRPr lang="en-US"/>
           </a:p>
@@ -1297,7 +1754,7 @@
     </p:spTree>
     <p:extLst>
       <p:ext uri="{BB962C8B-B14F-4D97-AF65-F5344CB8AC3E}">
-        <p14:creationId xmlns:p14="http://schemas.microsoft.com/office/powerpoint/2010/main" val="3461511907"/>
+        <p14:creationId xmlns:p14="http://schemas.microsoft.com/office/powerpoint/2010/main" val="2169517287"/>
       </p:ext>
     </p:extLst>
   </p:cSld>
@@ -1611,9 +2068,9 @@
           <a:bodyPr/>
           <a:lstStyle/>
           <a:p>
-            <a:fld id="{B1DD09B4-EBC7-4C7C-B5F4-0DB339DE71B3}" type="datetimeFigureOut">
-              <a:rPr lang="en-US" smtClean="0"/>
-              <a:t>7/24/2020</a:t>
+            <a:fld id="{B84B3AD9-673D-478D-B73E-ACE97C9A13E6}" type="datetime1">
+              <a:rPr lang="en-US" smtClean="0"/>
+              <a:t>7/26/2020</a:t>
             </a:fld>
             <a:endParaRPr lang="en-US"/>
           </a:p>
@@ -1664,7 +2121,7 @@
     </p:spTree>
     <p:extLst>
       <p:ext uri="{BB962C8B-B14F-4D97-AF65-F5344CB8AC3E}">
-        <p14:creationId xmlns:p14="http://schemas.microsoft.com/office/powerpoint/2010/main" val="673849364"/>
+        <p14:creationId xmlns:p14="http://schemas.microsoft.com/office/powerpoint/2010/main" val="1141930099"/>
       </p:ext>
     </p:extLst>
   </p:cSld>
@@ -1729,9 +2186,9 @@
           <a:bodyPr/>
           <a:lstStyle/>
           <a:p>
-            <a:fld id="{B1DD09B4-EBC7-4C7C-B5F4-0DB339DE71B3}" type="datetimeFigureOut">
-              <a:rPr lang="en-US" smtClean="0"/>
-              <a:t>7/24/2020</a:t>
+            <a:fld id="{5CFEE832-FA3F-413C-B995-0247E4B9F3B6}" type="datetime1">
+              <a:rPr lang="en-US" smtClean="0"/>
+              <a:t>7/26/2020</a:t>
             </a:fld>
             <a:endParaRPr lang="en-US"/>
           </a:p>
@@ -1782,7 +2239,7 @@
     </p:spTree>
     <p:extLst>
       <p:ext uri="{BB962C8B-B14F-4D97-AF65-F5344CB8AC3E}">
-        <p14:creationId xmlns:p14="http://schemas.microsoft.com/office/powerpoint/2010/main" val="2673108927"/>
+        <p14:creationId xmlns:p14="http://schemas.microsoft.com/office/powerpoint/2010/main" val="2246000771"/>
       </p:ext>
     </p:extLst>
   </p:cSld>
@@ -1824,9 +2281,9 @@
           <a:bodyPr/>
           <a:lstStyle/>
           <a:p>
-            <a:fld id="{B1DD09B4-EBC7-4C7C-B5F4-0DB339DE71B3}" type="datetimeFigureOut">
-              <a:rPr lang="en-US" smtClean="0"/>
-              <a:t>7/24/2020</a:t>
+            <a:fld id="{7C36E17E-BE75-44DB-BFCF-E043AC7CD59C}" type="datetime1">
+              <a:rPr lang="en-US" smtClean="0"/>
+              <a:t>7/26/2020</a:t>
             </a:fld>
             <a:endParaRPr lang="en-US"/>
           </a:p>
@@ -1877,7 +2334,7 @@
     </p:spTree>
     <p:extLst>
       <p:ext uri="{BB962C8B-B14F-4D97-AF65-F5344CB8AC3E}">
-        <p14:creationId xmlns:p14="http://schemas.microsoft.com/office/powerpoint/2010/main" val="878020934"/>
+        <p14:creationId xmlns:p14="http://schemas.microsoft.com/office/powerpoint/2010/main" val="3169933304"/>
       </p:ext>
     </p:extLst>
   </p:cSld>
@@ -2101,9 +2558,9 @@
           <a:bodyPr/>
           <a:lstStyle/>
           <a:p>
-            <a:fld id="{B1DD09B4-EBC7-4C7C-B5F4-0DB339DE71B3}" type="datetimeFigureOut">
-              <a:rPr lang="en-US" smtClean="0"/>
-              <a:t>7/24/2020</a:t>
+            <a:fld id="{DA43EF33-F292-4600-8567-42F29EE63603}" type="datetime1">
+              <a:rPr lang="en-US" smtClean="0"/>
+              <a:t>7/26/2020</a:t>
             </a:fld>
             <a:endParaRPr lang="en-US"/>
           </a:p>
@@ -2154,7 +2611,7 @@
     </p:spTree>
     <p:extLst>
       <p:ext uri="{BB962C8B-B14F-4D97-AF65-F5344CB8AC3E}">
-        <p14:creationId xmlns:p14="http://schemas.microsoft.com/office/powerpoint/2010/main" val="2049703298"/>
+        <p14:creationId xmlns:p14="http://schemas.microsoft.com/office/powerpoint/2010/main" val="3062053707"/>
       </p:ext>
     </p:extLst>
   </p:cSld>
@@ -2354,9 +2811,9 @@
           <a:bodyPr/>
           <a:lstStyle/>
           <a:p>
-            <a:fld id="{B1DD09B4-EBC7-4C7C-B5F4-0DB339DE71B3}" type="datetimeFigureOut">
-              <a:rPr lang="en-US" smtClean="0"/>
-              <a:t>7/24/2020</a:t>
+            <a:fld id="{7151DE12-2648-4BC2-A3D5-C4759A39D9B6}" type="datetime1">
+              <a:rPr lang="en-US" smtClean="0"/>
+              <a:t>7/26/2020</a:t>
             </a:fld>
             <a:endParaRPr lang="en-US"/>
           </a:p>
@@ -2407,7 +2864,7 @@
     </p:spTree>
     <p:extLst>
       <p:ext uri="{BB962C8B-B14F-4D97-AF65-F5344CB8AC3E}">
-        <p14:creationId xmlns:p14="http://schemas.microsoft.com/office/powerpoint/2010/main" val="3679839762"/>
+        <p14:creationId xmlns:p14="http://schemas.microsoft.com/office/powerpoint/2010/main" val="1176806083"/>
       </p:ext>
     </p:extLst>
   </p:cSld>
@@ -2421,9 +2878,14 @@
 <p:sldMaster xmlns:a="http://schemas.openxmlformats.org/drawingml/2006/main" xmlns:r="http://schemas.openxmlformats.org/officeDocument/2006/relationships" xmlns:p="http://schemas.openxmlformats.org/presentationml/2006/main">
   <p:cSld>
     <p:bg>
-      <p:bgRef idx="1001">
-        <a:schemeClr val="bg1"/>
-      </p:bgRef>
+      <p:bgPr>
+        <a:solidFill>
+          <a:schemeClr val="bg1">
+            <a:lumMod val="95000"/>
+          </a:schemeClr>
+        </a:solidFill>
+        <a:effectLst/>
+      </p:bgPr>
     </p:bg>
     <p:spTree>
       <p:nvGrpSpPr>
@@ -2567,9 +3029,9 @@
             </a:lvl1pPr>
           </a:lstStyle>
           <a:p>
-            <a:fld id="{B1DD09B4-EBC7-4C7C-B5F4-0DB339DE71B3}" type="datetimeFigureOut">
-              <a:rPr lang="en-US" smtClean="0"/>
-              <a:t>7/24/2020</a:t>
+            <a:fld id="{14C16A73-1820-4861-BAB2-EA78E8B68D30}" type="datetime1">
+              <a:rPr lang="en-US" smtClean="0"/>
+              <a:t>7/26/2020</a:t>
             </a:fld>
             <a:endParaRPr lang="en-US"/>
           </a:p>
@@ -2653,27 +3115,70 @@
           </a:p>
         </p:txBody>
       </p:sp>
+      <p:cxnSp>
+        <p:nvCxnSpPr>
+          <p:cNvPr id="8" name="Straight Connector 7"/>
+          <p:cNvCxnSpPr/>
+          <p:nvPr userDrawn="1"/>
+        </p:nvCxnSpPr>
+        <p:spPr>
+          <a:xfrm>
+            <a:off x="294290" y="0"/>
+            <a:ext cx="10510" cy="6858000"/>
+          </a:xfrm>
+          <a:prstGeom prst="line">
+            <a:avLst/>
+          </a:prstGeom>
+          <a:ln w="38100">
+            <a:solidFill>
+              <a:srgbClr val="CC0000"/>
+            </a:solidFill>
+          </a:ln>
+        </p:spPr>
+        <p:style>
+          <a:lnRef idx="1">
+            <a:schemeClr val="accent1"/>
+          </a:lnRef>
+          <a:fillRef idx="0">
+            <a:schemeClr val="accent1"/>
+          </a:fillRef>
+          <a:effectRef idx="0">
+            <a:schemeClr val="accent1"/>
+          </a:effectRef>
+          <a:fontRef idx="minor">
+            <a:schemeClr val="tx1"/>
+          </a:fontRef>
+        </p:style>
+      </p:cxnSp>
     </p:spTree>
     <p:extLst>
       <p:ext uri="{BB962C8B-B14F-4D97-AF65-F5344CB8AC3E}">
-        <p14:creationId xmlns:p14="http://schemas.microsoft.com/office/powerpoint/2010/main" val="210104937"/>
+        <p14:creationId xmlns:p14="http://schemas.microsoft.com/office/powerpoint/2010/main" val="3746638507"/>
       </p:ext>
     </p:extLst>
   </p:cSld>
   <p:clrMap bg1="lt1" tx1="dk1" bg2="lt2" tx2="dk2" accent1="accent1" accent2="accent2" accent3="accent3" accent4="accent4" accent5="accent5" accent6="accent6" hlink="hlink" folHlink="folHlink"/>
   <p:sldLayoutIdLst>
-    <p:sldLayoutId id="2147483649" r:id="rId1"/>
-    <p:sldLayoutId id="2147483650" r:id="rId2"/>
-    <p:sldLayoutId id="2147483651" r:id="rId3"/>
-    <p:sldLayoutId id="2147483652" r:id="rId4"/>
-    <p:sldLayoutId id="2147483653" r:id="rId5"/>
-    <p:sldLayoutId id="2147483654" r:id="rId6"/>
-    <p:sldLayoutId id="2147483655" r:id="rId7"/>
-    <p:sldLayoutId id="2147483656" r:id="rId8"/>
-    <p:sldLayoutId id="2147483657" r:id="rId9"/>
-    <p:sldLayoutId id="2147483658" r:id="rId10"/>
-    <p:sldLayoutId id="2147483659" r:id="rId11"/>
+    <p:sldLayoutId id="2147483700" r:id="rId1"/>
+    <p:sldLayoutId id="2147483701" r:id="rId2"/>
+    <p:sldLayoutId id="2147483702" r:id="rId3"/>
+    <p:sldLayoutId id="2147483703" r:id="rId4"/>
+    <p:sldLayoutId id="2147483704" r:id="rId5"/>
+    <p:sldLayoutId id="2147483705" r:id="rId6"/>
+    <p:sldLayoutId id="2147483706" r:id="rId7"/>
+    <p:sldLayoutId id="2147483707" r:id="rId8"/>
+    <p:sldLayoutId id="2147483708" r:id="rId9"/>
+    <p:sldLayoutId id="2147483709" r:id="rId10"/>
+    <p:sldLayoutId id="2147483710" r:id="rId11"/>
   </p:sldLayoutIdLst>
+  <p:timing>
+    <p:tnLst>
+      <p:par>
+        <p:cTn id="1" dur="indefinite" restart="never" nodeType="tmRoot"/>
+      </p:par>
+    </p:tnLst>
+  </p:timing>
+  <p:hf hdr="0" ftr="0" dt="0"/>
   <p:txStyles>
     <p:titleStyle>
       <a:lvl1pPr algn="l" defTabSz="914400" rtl="0" eaLnBrk="1" latinLnBrk="0" hangingPunct="1">
@@ -2686,7 +3191,7 @@
         <a:buNone/>
         <a:defRPr sz="4400" kern="1200">
           <a:solidFill>
-            <a:schemeClr val="tx1"/>
+            <a:srgbClr val="CC0000"/>
           </a:solidFill>
           <a:latin typeface="+mj-lt"/>
           <a:ea typeface="+mj-ea"/>
@@ -3009,7 +3514,9 @@
         </p:nvSpPr>
         <p:spPr/>
         <p:txBody>
-          <a:bodyPr/>
+          <a:bodyPr>
+            <a:normAutofit/>
+          </a:bodyPr>
           <a:lstStyle/>
           <a:p>
             <a:r>
@@ -3042,6 +3549,13 @@
   <p:clrMapOvr>
     <a:masterClrMapping/>
   </p:clrMapOvr>
+  <p:timing>
+    <p:tnLst>
+      <p:par>
+        <p:cTn id="1" dur="indefinite" restart="never" nodeType="tmRoot"/>
+      </p:par>
+    </p:tnLst>
+  </p:timing>
 </p:sld>
 </file>
 
@@ -3079,7 +3593,7 @@
           <a:p>
             <a:r>
               <a:rPr lang="en-US" dirty="0" smtClean="0"/>
-              <a:t>Outcome/Conclusion</a:t>
+              <a:t>Conclusion</a:t>
             </a:r>
             <a:endParaRPr lang="en-US" dirty="0"/>
           </a:p>
@@ -3092,101 +3606,337 @@
             <a:spLocks noGrp="1"/>
           </p:cNvSpPr>
           <p:nvPr>
-            <p:ph idx="1"/>
-          </p:nvPr>
-        </p:nvSpPr>
-        <p:spPr/>
-        <p:txBody>
-          <a:bodyPr/>
-          <a:lstStyle/>
-          <a:p>
-            <a:r>
-              <a:rPr lang="en-US" dirty="0"/>
-              <a:t>Project achieves stated </a:t>
-            </a:r>
+            <p:ph sz="half" idx="1"/>
+          </p:nvPr>
+        </p:nvSpPr>
+        <p:spPr>
+          <a:xfrm>
+            <a:off x="838200" y="3330082"/>
+            <a:ext cx="5181600" cy="2846879"/>
+          </a:xfrm>
+        </p:spPr>
+        <p:txBody>
+          <a:bodyPr>
+            <a:normAutofit/>
+          </a:bodyPr>
+          <a:lstStyle/>
+          <a:p>
             <a:r>
               <a:rPr lang="en-US" dirty="0" smtClean="0"/>
-              <a:t>objectives and </a:t>
-            </a:r>
-            <a:r>
-              <a:rPr lang="en-US" dirty="0"/>
-              <a:t>evidence-based </a:t>
+              <a:t>Recommend new </a:t>
             </a:r>
             <a:r>
               <a:rPr lang="en-US" dirty="0" smtClean="0"/>
-              <a:t>actionable steps </a:t>
-            </a:r>
-            <a:r>
-              <a:rPr lang="en-US" dirty="0"/>
-              <a:t>for future </a:t>
-            </a:r>
+              <a:t>stores in these cities:</a:t>
+            </a:r>
+          </a:p>
+          <a:p>
+            <a:pPr lvl="1"/>
             <a:r>
               <a:rPr lang="en-US" dirty="0" smtClean="0"/>
-              <a:t>recommendations are </a:t>
-            </a:r>
-            <a:r>
-              <a:rPr lang="en-US" dirty="0"/>
-              <a:t>given</a:t>
-            </a:r>
+              <a:t>Seattle, WA</a:t>
+            </a:r>
+            <a:endParaRPr lang="en-US" dirty="0" smtClean="0"/>
+          </a:p>
+          <a:p>
+            <a:pPr lvl="1"/>
             <a:r>
               <a:rPr lang="en-US" dirty="0" smtClean="0"/>
-              <a:t>.</a:t>
-            </a:r>
-          </a:p>
-          <a:p>
+              <a:t>Denver, CO</a:t>
+            </a:r>
+            <a:endParaRPr lang="en-US" dirty="0" smtClean="0"/>
+          </a:p>
+          <a:p>
+            <a:pPr lvl="1"/>
             <a:r>
               <a:rPr lang="en-US" dirty="0" smtClean="0"/>
-              <a:t>Focus on new stores in these cities:</a:t>
+              <a:t>Portland, OR</a:t>
             </a:r>
           </a:p>
           <a:p>
             <a:pPr lvl="1"/>
             <a:r>
               <a:rPr lang="en-US" dirty="0" smtClean="0"/>
-              <a:t>A</a:t>
+              <a:t>San Juan, PR</a:t>
+            </a:r>
+            <a:endParaRPr lang="en-US" dirty="0" smtClean="0"/>
+          </a:p>
+        </p:txBody>
+      </p:sp>
+      <p:sp>
+        <p:nvSpPr>
+          <p:cNvPr id="4" name="Content Placeholder 3"/>
+          <p:cNvSpPr>
+            <a:spLocks noGrp="1"/>
+          </p:cNvSpPr>
+          <p:nvPr>
+            <p:ph sz="half" idx="2"/>
+          </p:nvPr>
+        </p:nvSpPr>
+        <p:spPr>
+          <a:xfrm>
+            <a:off x="6172200" y="3330082"/>
+            <a:ext cx="5181600" cy="2846880"/>
+          </a:xfrm>
+        </p:spPr>
+        <p:txBody>
+          <a:bodyPr>
+            <a:normAutofit/>
+          </a:bodyPr>
+          <a:lstStyle/>
+          <a:p>
+            <a:r>
+              <a:rPr lang="en-US" dirty="0" smtClean="0"/>
+              <a:t>Recommend new cities in these states:</a:t>
             </a:r>
           </a:p>
           <a:p>
             <a:pPr lvl="1"/>
             <a:r>
               <a:rPr lang="en-US" dirty="0" smtClean="0"/>
-              <a:t>B</a:t>
+              <a:t>Wisconsin</a:t>
             </a:r>
           </a:p>
           <a:p>
             <a:pPr lvl="1"/>
             <a:r>
               <a:rPr lang="en-US" dirty="0" smtClean="0"/>
-              <a:t>C</a:t>
-            </a:r>
-          </a:p>
-          <a:p>
+              <a:t>Arkansas</a:t>
+            </a:r>
+          </a:p>
+          <a:p>
+            <a:pPr lvl="1"/>
             <a:r>
               <a:rPr lang="en-US" dirty="0" smtClean="0"/>
-              <a:t>Focus on new cities in these states:</a:t>
+              <a:t>Utah</a:t>
             </a:r>
           </a:p>
           <a:p>
             <a:pPr lvl="1"/>
             <a:r>
               <a:rPr lang="en-US" dirty="0" smtClean="0"/>
-              <a:t>D</a:t>
-            </a:r>
-          </a:p>
-          <a:p>
-            <a:pPr lvl="1"/>
+              <a:t>Iowa</a:t>
+            </a:r>
+            <a:endParaRPr lang="en-US" dirty="0" smtClean="0"/>
+          </a:p>
+          <a:p>
+            <a:endParaRPr lang="en-US" dirty="0"/>
+          </a:p>
+        </p:txBody>
+      </p:sp>
+      <p:sp>
+        <p:nvSpPr>
+          <p:cNvPr id="5" name="Content Placeholder 2"/>
+          <p:cNvSpPr txBox="1">
+            <a:spLocks/>
+          </p:cNvSpPr>
+          <p:nvPr/>
+        </p:nvSpPr>
+        <p:spPr>
+          <a:xfrm>
+            <a:off x="838200" y="1825625"/>
+            <a:ext cx="10515600" cy="1369520"/>
+          </a:xfrm>
+          <a:prstGeom prst="rect">
+            <a:avLst/>
+          </a:prstGeom>
+        </p:spPr>
+        <p:txBody>
+          <a:bodyPr vert="horz" lIns="91440" tIns="45720" rIns="91440" bIns="45720" rtlCol="0">
+            <a:normAutofit/>
+          </a:bodyPr>
+          <a:lstStyle>
+            <a:lvl1pPr marL="228600" indent="-228600" algn="l" defTabSz="914400" rtl="0" eaLnBrk="1" latinLnBrk="0" hangingPunct="1">
+              <a:lnSpc>
+                <a:spcPct val="90000"/>
+              </a:lnSpc>
+              <a:spcBef>
+                <a:spcPts val="1000"/>
+              </a:spcBef>
+              <a:buFont typeface="Arial" panose="020B0604020202020204" pitchFamily="34" charset="0"/>
+              <a:buChar char="•"/>
+              <a:defRPr sz="2800" kern="1200">
+                <a:solidFill>
+                  <a:schemeClr val="tx1"/>
+                </a:solidFill>
+                <a:latin typeface="+mn-lt"/>
+                <a:ea typeface="+mn-ea"/>
+                <a:cs typeface="+mn-cs"/>
+              </a:defRPr>
+            </a:lvl1pPr>
+            <a:lvl2pPr marL="685800" indent="-228600" algn="l" defTabSz="914400" rtl="0" eaLnBrk="1" latinLnBrk="0" hangingPunct="1">
+              <a:lnSpc>
+                <a:spcPct val="90000"/>
+              </a:lnSpc>
+              <a:spcBef>
+                <a:spcPts val="500"/>
+              </a:spcBef>
+              <a:buFont typeface="Arial" panose="020B0604020202020204" pitchFamily="34" charset="0"/>
+              <a:buChar char="•"/>
+              <a:defRPr sz="2400" kern="1200">
+                <a:solidFill>
+                  <a:schemeClr val="tx1"/>
+                </a:solidFill>
+                <a:latin typeface="+mn-lt"/>
+                <a:ea typeface="+mn-ea"/>
+                <a:cs typeface="+mn-cs"/>
+              </a:defRPr>
+            </a:lvl2pPr>
+            <a:lvl3pPr marL="1143000" indent="-228600" algn="l" defTabSz="914400" rtl="0" eaLnBrk="1" latinLnBrk="0" hangingPunct="1">
+              <a:lnSpc>
+                <a:spcPct val="90000"/>
+              </a:lnSpc>
+              <a:spcBef>
+                <a:spcPts val="500"/>
+              </a:spcBef>
+              <a:buFont typeface="Arial" panose="020B0604020202020204" pitchFamily="34" charset="0"/>
+              <a:buChar char="•"/>
+              <a:defRPr sz="2000" kern="1200">
+                <a:solidFill>
+                  <a:schemeClr val="tx1"/>
+                </a:solidFill>
+                <a:latin typeface="+mn-lt"/>
+                <a:ea typeface="+mn-ea"/>
+                <a:cs typeface="+mn-cs"/>
+              </a:defRPr>
+            </a:lvl3pPr>
+            <a:lvl4pPr marL="1600200" indent="-228600" algn="l" defTabSz="914400" rtl="0" eaLnBrk="1" latinLnBrk="0" hangingPunct="1">
+              <a:lnSpc>
+                <a:spcPct val="90000"/>
+              </a:lnSpc>
+              <a:spcBef>
+                <a:spcPts val="500"/>
+              </a:spcBef>
+              <a:buFont typeface="Arial" panose="020B0604020202020204" pitchFamily="34" charset="0"/>
+              <a:buChar char="•"/>
+              <a:defRPr sz="1800" kern="1200">
+                <a:solidFill>
+                  <a:schemeClr val="tx1"/>
+                </a:solidFill>
+                <a:latin typeface="+mn-lt"/>
+                <a:ea typeface="+mn-ea"/>
+                <a:cs typeface="+mn-cs"/>
+              </a:defRPr>
+            </a:lvl4pPr>
+            <a:lvl5pPr marL="2057400" indent="-228600" algn="l" defTabSz="914400" rtl="0" eaLnBrk="1" latinLnBrk="0" hangingPunct="1">
+              <a:lnSpc>
+                <a:spcPct val="90000"/>
+              </a:lnSpc>
+              <a:spcBef>
+                <a:spcPts val="500"/>
+              </a:spcBef>
+              <a:buFont typeface="Arial" panose="020B0604020202020204" pitchFamily="34" charset="0"/>
+              <a:buChar char="•"/>
+              <a:defRPr sz="1800" kern="1200">
+                <a:solidFill>
+                  <a:schemeClr val="tx1"/>
+                </a:solidFill>
+                <a:latin typeface="+mn-lt"/>
+                <a:ea typeface="+mn-ea"/>
+                <a:cs typeface="+mn-cs"/>
+              </a:defRPr>
+            </a:lvl5pPr>
+            <a:lvl6pPr marL="2514600" indent="-228600" algn="l" defTabSz="914400" rtl="0" eaLnBrk="1" latinLnBrk="0" hangingPunct="1">
+              <a:lnSpc>
+                <a:spcPct val="90000"/>
+              </a:lnSpc>
+              <a:spcBef>
+                <a:spcPts val="500"/>
+              </a:spcBef>
+              <a:buFont typeface="Arial" panose="020B0604020202020204" pitchFamily="34" charset="0"/>
+              <a:buChar char="•"/>
+              <a:defRPr sz="1800" kern="1200">
+                <a:solidFill>
+                  <a:schemeClr val="tx1"/>
+                </a:solidFill>
+                <a:latin typeface="+mn-lt"/>
+                <a:ea typeface="+mn-ea"/>
+                <a:cs typeface="+mn-cs"/>
+              </a:defRPr>
+            </a:lvl6pPr>
+            <a:lvl7pPr marL="2971800" indent="-228600" algn="l" defTabSz="914400" rtl="0" eaLnBrk="1" latinLnBrk="0" hangingPunct="1">
+              <a:lnSpc>
+                <a:spcPct val="90000"/>
+              </a:lnSpc>
+              <a:spcBef>
+                <a:spcPts val="500"/>
+              </a:spcBef>
+              <a:buFont typeface="Arial" panose="020B0604020202020204" pitchFamily="34" charset="0"/>
+              <a:buChar char="•"/>
+              <a:defRPr sz="1800" kern="1200">
+                <a:solidFill>
+                  <a:schemeClr val="tx1"/>
+                </a:solidFill>
+                <a:latin typeface="+mn-lt"/>
+                <a:ea typeface="+mn-ea"/>
+                <a:cs typeface="+mn-cs"/>
+              </a:defRPr>
+            </a:lvl7pPr>
+            <a:lvl8pPr marL="3429000" indent="-228600" algn="l" defTabSz="914400" rtl="0" eaLnBrk="1" latinLnBrk="0" hangingPunct="1">
+              <a:lnSpc>
+                <a:spcPct val="90000"/>
+              </a:lnSpc>
+              <a:spcBef>
+                <a:spcPts val="500"/>
+              </a:spcBef>
+              <a:buFont typeface="Arial" panose="020B0604020202020204" pitchFamily="34" charset="0"/>
+              <a:buChar char="•"/>
+              <a:defRPr sz="1800" kern="1200">
+                <a:solidFill>
+                  <a:schemeClr val="tx1"/>
+                </a:solidFill>
+                <a:latin typeface="+mn-lt"/>
+                <a:ea typeface="+mn-ea"/>
+                <a:cs typeface="+mn-cs"/>
+              </a:defRPr>
+            </a:lvl8pPr>
+            <a:lvl9pPr marL="3886200" indent="-228600" algn="l" defTabSz="914400" rtl="0" eaLnBrk="1" latinLnBrk="0" hangingPunct="1">
+              <a:lnSpc>
+                <a:spcPct val="90000"/>
+              </a:lnSpc>
+              <a:spcBef>
+                <a:spcPts val="500"/>
+              </a:spcBef>
+              <a:buFont typeface="Arial" panose="020B0604020202020204" pitchFamily="34" charset="0"/>
+              <a:buChar char="•"/>
+              <a:defRPr sz="1800" kern="1200">
+                <a:solidFill>
+                  <a:schemeClr val="tx1"/>
+                </a:solidFill>
+                <a:latin typeface="+mn-lt"/>
+                <a:ea typeface="+mn-ea"/>
+                <a:cs typeface="+mn-cs"/>
+              </a:defRPr>
+            </a:lvl9pPr>
+          </a:lstStyle>
+          <a:p>
             <a:r>
               <a:rPr lang="en-US" dirty="0" smtClean="0"/>
-              <a:t>E</a:t>
-            </a:r>
-          </a:p>
-          <a:p>
-            <a:pPr lvl="1"/>
-            <a:r>
-              <a:rPr lang="en-US"/>
-              <a:t>F</a:t>
-            </a:r>
-            <a:endParaRPr lang="en-US" dirty="0"/>
+              <a:t>Based on the current number of CVS stores per person, CVS still has opportunity to grow new stores </a:t>
+            </a:r>
+          </a:p>
+        </p:txBody>
+      </p:sp>
+      <p:sp>
+        <p:nvSpPr>
+          <p:cNvPr id="6" name="Slide Number Placeholder 5"/>
+          <p:cNvSpPr>
+            <a:spLocks noGrp="1"/>
+          </p:cNvSpPr>
+          <p:nvPr>
+            <p:ph type="sldNum" sz="quarter" idx="12"/>
+          </p:nvPr>
+        </p:nvSpPr>
+        <p:spPr/>
+        <p:txBody>
+          <a:bodyPr/>
+          <a:lstStyle/>
+          <a:p>
+            <a:fld id="{BF6D4B1F-8553-483E-A902-D322D1246890}" type="slidenum">
+              <a:rPr lang="en-US" smtClean="0"/>
+              <a:t>10</a:t>
+            </a:fld>
+            <a:endParaRPr lang="en-US"/>
           </a:p>
         </p:txBody>
       </p:sp>
@@ -3200,11 +3950,18 @@
   <p:clrMapOvr>
     <a:masterClrMapping/>
   </p:clrMapOvr>
+  <p:timing>
+    <p:tnLst>
+      <p:par>
+        <p:cTn id="1" dur="indefinite" restart="never" nodeType="tmRoot"/>
+      </p:par>
+    </p:tnLst>
+  </p:timing>
 </p:sld>
 </file>
 
 <file path=ppt/slides/slide11.xml><?xml version="1.0" encoding="utf-8"?>
-<p:sld xmlns:a="http://schemas.openxmlformats.org/drawingml/2006/main" xmlns:r="http://schemas.openxmlformats.org/officeDocument/2006/relationships" xmlns:p="http://schemas.openxmlformats.org/presentationml/2006/main">
+<p:sld xmlns:a="http://schemas.openxmlformats.org/drawingml/2006/main" xmlns:r="http://schemas.openxmlformats.org/officeDocument/2006/relationships" xmlns:p="http://schemas.openxmlformats.org/presentationml/2006/main" show="0">
   <p:cSld>
     <p:spTree>
       <p:nvGrpSpPr>
@@ -3237,7 +3994,7 @@
           <a:p>
             <a:r>
               <a:rPr lang="en-US" dirty="0" smtClean="0"/>
-              <a:t>Presentation</a:t>
+              <a:t>Competitor Analysis</a:t>
             </a:r>
             <a:endParaRPr lang="en-US" dirty="0"/>
           </a:p>
@@ -3253,99 +4010,195 @@
             <p:ph idx="1"/>
           </p:nvPr>
         </p:nvSpPr>
-        <p:spPr>
-          <a:xfrm>
-            <a:off x="838200" y="1825625"/>
-            <a:ext cx="10515600" cy="4351338"/>
-          </a:xfrm>
-        </p:spPr>
-        <p:txBody>
-          <a:bodyPr>
-            <a:normAutofit/>
-          </a:bodyPr>
-          <a:lstStyle/>
-          <a:p>
-            <a:r>
-              <a:rPr lang="en-US" dirty="0"/>
-              <a:t>The student effectively </a:t>
-            </a:r>
+        <p:spPr/>
+        <p:txBody>
+          <a:bodyPr/>
+          <a:lstStyle/>
+          <a:p>
             <a:r>
               <a:rPr lang="en-US" dirty="0" smtClean="0"/>
-              <a:t>presents their </a:t>
-            </a:r>
-            <a:r>
-              <a:rPr lang="en-US" dirty="0"/>
-              <a:t>project goals, analyses, </a:t>
-            </a:r>
+              <a:t>Walgreens facts</a:t>
+            </a:r>
+          </a:p>
+          <a:p>
             <a:r>
               <a:rPr lang="en-US" dirty="0" smtClean="0"/>
-              <a:t>and outcomes </a:t>
-            </a:r>
-            <a:r>
-              <a:rPr lang="en-US" dirty="0"/>
-              <a:t>in a logical </a:t>
-            </a:r>
-            <a:r>
-              <a:rPr lang="en-US" dirty="0" smtClean="0"/>
-              <a:t>and easy-to-follow </a:t>
-            </a:r>
-            <a:r>
-              <a:rPr lang="en-US" dirty="0"/>
-              <a:t>way. </a:t>
-            </a:r>
-            <a:r>
-              <a:rPr lang="en-US" dirty="0" smtClean="0"/>
-              <a:t>Visualizations used </a:t>
-            </a:r>
-            <a:r>
-              <a:rPr lang="en-US" dirty="0"/>
-              <a:t>effectively convey </a:t>
-            </a:r>
-            <a:r>
-              <a:rPr lang="en-US" dirty="0" smtClean="0"/>
-              <a:t>the intended </a:t>
-            </a:r>
-            <a:r>
-              <a:rPr lang="en-US" dirty="0"/>
-              <a:t>messages. </a:t>
-            </a:r>
-            <a:r>
-              <a:rPr lang="en-US" dirty="0" smtClean="0"/>
-              <a:t>Presentation clearly </a:t>
-            </a:r>
-            <a:r>
-              <a:rPr lang="en-US" dirty="0"/>
-              <a:t>indicates that time </a:t>
-            </a:r>
-            <a:r>
-              <a:rPr lang="en-US" dirty="0" smtClean="0"/>
-              <a:t>was dedicated </a:t>
-            </a:r>
-            <a:r>
-              <a:rPr lang="en-US" dirty="0"/>
-              <a:t>for development </a:t>
-            </a:r>
-            <a:r>
-              <a:rPr lang="en-US" dirty="0" smtClean="0"/>
-              <a:t>and practice </a:t>
-            </a:r>
-            <a:r>
-              <a:rPr lang="en-US" dirty="0"/>
-              <a:t>of the presentation.</a:t>
-            </a:r>
+              <a:t>Walgreens financials</a:t>
+            </a:r>
+            <a:endParaRPr lang="en-US" dirty="0"/>
+          </a:p>
+        </p:txBody>
+      </p:sp>
+      <p:sp>
+        <p:nvSpPr>
+          <p:cNvPr id="4" name="Slide Number Placeholder 3"/>
+          <p:cNvSpPr>
+            <a:spLocks noGrp="1"/>
+          </p:cNvSpPr>
+          <p:nvPr>
+            <p:ph type="sldNum" sz="quarter" idx="12"/>
+          </p:nvPr>
+        </p:nvSpPr>
+        <p:spPr/>
+        <p:txBody>
+          <a:bodyPr/>
+          <a:lstStyle/>
+          <a:p>
+            <a:fld id="{BF6D4B1F-8553-483E-A902-D322D1246890}" type="slidenum">
+              <a:rPr lang="en-US" smtClean="0"/>
+              <a:t>11</a:t>
+            </a:fld>
+            <a:endParaRPr lang="en-US"/>
           </a:p>
         </p:txBody>
       </p:sp>
     </p:spTree>
     <p:extLst>
       <p:ext uri="{BB962C8B-B14F-4D97-AF65-F5344CB8AC3E}">
-        <p14:creationId xmlns:p14="http://schemas.microsoft.com/office/powerpoint/2010/main" val="1732200627"/>
+        <p14:creationId xmlns:p14="http://schemas.microsoft.com/office/powerpoint/2010/main" val="3549639268"/>
       </p:ext>
     </p:extLst>
   </p:cSld>
   <p:clrMapOvr>
     <a:masterClrMapping/>
   </p:clrMapOvr>
+  <mc:AlternateContent xmlns:mc="http://schemas.openxmlformats.org/markup-compatibility/2006">
+    <mc:Choice xmlns:p14="http://schemas.microsoft.com/office/powerpoint/2010/main" Requires="p14">
+      <p:transition spd="slow" p14:dur="2000"/>
+    </mc:Choice>
+    <mc:Fallback>
+      <p:transition spd="slow"/>
+    </mc:Fallback>
+  </mc:AlternateContent>
+  <p:timing>
+    <p:tnLst>
+      <p:par>
+        <p:cTn id="1" dur="indefinite" restart="never" nodeType="tmRoot"/>
+      </p:par>
+    </p:tnLst>
+  </p:timing>
+</p:sld>
+</file>
+
+<file path=ppt/slides/slide12.xml><?xml version="1.0" encoding="utf-8"?>
+<p:sld xmlns:a="http://schemas.openxmlformats.org/drawingml/2006/main" xmlns:r="http://schemas.openxmlformats.org/officeDocument/2006/relationships" xmlns:p="http://schemas.openxmlformats.org/presentationml/2006/main" show="0">
+  <p:cSld>
+    <p:spTree>
+      <p:nvGrpSpPr>
+        <p:cNvPr id="1" name=""/>
+        <p:cNvGrpSpPr/>
+        <p:nvPr/>
+      </p:nvGrpSpPr>
+      <p:grpSpPr>
+        <a:xfrm>
+          <a:off x="0" y="0"/>
+          <a:ext cx="0" cy="0"/>
+          <a:chOff x="0" y="0"/>
+          <a:chExt cx="0" cy="0"/>
+        </a:xfrm>
+      </p:grpSpPr>
+      <p:sp>
+        <p:nvSpPr>
+          <p:cNvPr id="2" name="Title 1"/>
+          <p:cNvSpPr>
+            <a:spLocks noGrp="1"/>
+          </p:cNvSpPr>
+          <p:nvPr>
+            <p:ph type="title"/>
+          </p:nvPr>
+        </p:nvSpPr>
+        <p:spPr/>
+        <p:txBody>
+          <a:bodyPr/>
+          <a:lstStyle/>
+          <a:p>
+            <a:r>
+              <a:rPr lang="en-US" dirty="0" smtClean="0"/>
+              <a:t>Competitor Analysis</a:t>
+            </a:r>
+            <a:endParaRPr lang="en-US" dirty="0"/>
+          </a:p>
+        </p:txBody>
+      </p:sp>
+      <p:sp>
+        <p:nvSpPr>
+          <p:cNvPr id="3" name="Content Placeholder 2"/>
+          <p:cNvSpPr>
+            <a:spLocks noGrp="1"/>
+          </p:cNvSpPr>
+          <p:nvPr>
+            <p:ph idx="1"/>
+          </p:nvPr>
+        </p:nvSpPr>
+        <p:spPr/>
+        <p:txBody>
+          <a:bodyPr/>
+          <a:lstStyle/>
+          <a:p>
+            <a:r>
+              <a:rPr lang="en-US" dirty="0" smtClean="0"/>
+              <a:t>Highlight cities where </a:t>
+            </a:r>
+            <a:r>
+              <a:rPr lang="en-US" dirty="0" err="1" smtClean="0"/>
+              <a:t>walgreens</a:t>
+            </a:r>
+            <a:r>
+              <a:rPr lang="en-US" dirty="0" smtClean="0"/>
+              <a:t> has less than expected presence</a:t>
+            </a:r>
+            <a:endParaRPr lang="en-US" dirty="0"/>
+          </a:p>
+        </p:txBody>
+      </p:sp>
+      <p:sp>
+        <p:nvSpPr>
+          <p:cNvPr id="4" name="Slide Number Placeholder 3"/>
+          <p:cNvSpPr>
+            <a:spLocks noGrp="1"/>
+          </p:cNvSpPr>
+          <p:nvPr>
+            <p:ph type="sldNum" sz="quarter" idx="12"/>
+          </p:nvPr>
+        </p:nvSpPr>
+        <p:spPr/>
+        <p:txBody>
+          <a:bodyPr/>
+          <a:lstStyle/>
+          <a:p>
+            <a:fld id="{BF6D4B1F-8553-483E-A902-D322D1246890}" type="slidenum">
+              <a:rPr lang="en-US" smtClean="0"/>
+              <a:t>12</a:t>
+            </a:fld>
+            <a:endParaRPr lang="en-US"/>
+          </a:p>
+        </p:txBody>
+      </p:sp>
+    </p:spTree>
+    <p:extLst>
+      <p:ext uri="{BB962C8B-B14F-4D97-AF65-F5344CB8AC3E}">
+        <p14:creationId xmlns:p14="http://schemas.microsoft.com/office/powerpoint/2010/main" val="2836903766"/>
+      </p:ext>
+    </p:extLst>
+  </p:cSld>
+  <p:clrMapOvr>
+    <a:masterClrMapping/>
+  </p:clrMapOvr>
+  <mc:AlternateContent xmlns:mc="http://schemas.openxmlformats.org/markup-compatibility/2006">
+    <mc:Choice xmlns:p14="http://schemas.microsoft.com/office/powerpoint/2010/main" Requires="p14">
+      <p:transition spd="slow" p14:dur="2000"/>
+    </mc:Choice>
+    <mc:Fallback>
+      <p:transition spd="slow"/>
+    </mc:Fallback>
+  </mc:AlternateContent>
+  <p:timing>
+    <p:tnLst>
+      <p:par>
+        <p:cTn id="1" dur="indefinite" restart="never" nodeType="tmRoot"/>
+      </p:par>
+    </p:tnLst>
+  </p:timing>
 </p:sld>
 </file>
 
@@ -3401,34 +4254,105 @@
         </p:nvSpPr>
         <p:spPr/>
         <p:txBody>
-          <a:bodyPr/>
+          <a:bodyPr>
+            <a:normAutofit/>
+          </a:bodyPr>
           <a:lstStyle/>
           <a:p>
             <a:r>
               <a:rPr lang="en-US" dirty="0" smtClean="0"/>
-              <a:t>Facts</a:t>
-            </a:r>
-          </a:p>
-          <a:p>
-            <a:pPr lvl="1"/>
+              <a:t>~10,000 stores in the United States</a:t>
+            </a:r>
+          </a:p>
+          <a:p>
             <a:r>
               <a:rPr lang="en-US" dirty="0" smtClean="0"/>
-              <a:t>10K stores</a:t>
+              <a:t>$256B in revenue in 2019</a:t>
             </a:r>
           </a:p>
           <a:p>
             <a:r>
               <a:rPr lang="en-US" dirty="0" smtClean="0"/>
-              <a:t>Financials</a:t>
-            </a:r>
-          </a:p>
-          <a:p>
-            <a:pPr lvl="1"/>
-            <a:r>
+              <a:t>Top sources of income are pharmacy sales ($141B) </a:t>
+            </a:r>
+            <a:br>
               <a:rPr lang="en-US" dirty="0" smtClean="0"/>
-              <a:t>Biggest sources of revenue?</a:t>
+            </a:br>
+            <a:r>
+              <a:rPr lang="en-US" dirty="0" smtClean="0"/>
+              <a:t>and in-store sales ($86B)*</a:t>
+            </a:r>
+            <a:endParaRPr lang="en-US" baseline="30000" dirty="0" smtClean="0"/>
+          </a:p>
+          <a:p>
+            <a:r>
+              <a:rPr lang="en-US" dirty="0" smtClean="0"/>
+              <a:t>Majority of pharmacy sales are within the pharmacy network (in-store)</a:t>
+            </a:r>
+          </a:p>
+          <a:p>
+            <a:r>
+              <a:rPr lang="en-US" dirty="0" smtClean="0"/>
+              <a:t>Increasing brick-and-mortar presence is still a viable way to grow revenue.</a:t>
             </a:r>
             <a:endParaRPr lang="en-US" dirty="0"/>
+          </a:p>
+        </p:txBody>
+      </p:sp>
+      <p:sp>
+        <p:nvSpPr>
+          <p:cNvPr id="4" name="TextBox 3"/>
+          <p:cNvSpPr txBox="1"/>
+          <p:nvPr/>
+        </p:nvSpPr>
+        <p:spPr>
+          <a:xfrm>
+            <a:off x="838200" y="6173843"/>
+            <a:ext cx="5414682" cy="261610"/>
+          </a:xfrm>
+          <a:prstGeom prst="rect">
+            <a:avLst/>
+          </a:prstGeom>
+          <a:noFill/>
+        </p:spPr>
+        <p:txBody>
+          <a:bodyPr wrap="square" rtlCol="0">
+            <a:spAutoFit/>
+          </a:bodyPr>
+          <a:lstStyle/>
+          <a:p>
+            <a:r>
+              <a:rPr lang="en-US" sz="1050" baseline="30000" dirty="0" smtClean="0"/>
+              <a:t>*</a:t>
+            </a:r>
+            <a:r>
+              <a:rPr lang="en-US" sz="1050" dirty="0" smtClean="0"/>
+              <a:t>CVS Health 2019 10-K SEC Filing. </a:t>
+            </a:r>
+            <a:endParaRPr lang="en-US" sz="1050" dirty="0"/>
+          </a:p>
+        </p:txBody>
+      </p:sp>
+      <p:sp>
+        <p:nvSpPr>
+          <p:cNvPr id="5" name="Slide Number Placeholder 4"/>
+          <p:cNvSpPr>
+            <a:spLocks noGrp="1"/>
+          </p:cNvSpPr>
+          <p:nvPr>
+            <p:ph type="sldNum" sz="quarter" idx="12"/>
+          </p:nvPr>
+        </p:nvSpPr>
+        <p:spPr/>
+        <p:txBody>
+          <a:bodyPr/>
+          <a:lstStyle/>
+          <a:p>
+            <a:fld id="{BF6D4B1F-8553-483E-A902-D322D1246890}" type="slidenum">
+              <a:rPr lang="en-US" smtClean="0"/>
+              <a:t>2</a:t>
+            </a:fld>
+            <a:endParaRPr lang="en-US"/>
           </a:p>
         </p:txBody>
       </p:sp>
@@ -3442,6 +4366,13 @@
   <p:clrMapOvr>
     <a:masterClrMapping/>
   </p:clrMapOvr>
+  <p:timing>
+    <p:tnLst>
+      <p:par>
+        <p:cTn id="1" dur="indefinite" restart="never" nodeType="tmRoot"/>
+      </p:par>
+    </p:tnLst>
+  </p:timing>
 </p:sld>
 </file>
 
@@ -3479,7 +4410,7 @@
           <a:p>
             <a:r>
               <a:rPr lang="en-US" dirty="0" smtClean="0"/>
-              <a:t>Problem Statement/Value Proposition</a:t>
+              <a:t>CVS Pharmacy</a:t>
             </a:r>
             <a:endParaRPr lang="en-US" dirty="0"/>
           </a:p>
@@ -3500,36 +4431,69 @@
           <a:bodyPr/>
           <a:lstStyle/>
           <a:p>
-            <a:r>
-              <a:rPr lang="en-US" i="1" dirty="0" smtClean="0"/>
-              <a:t>CVS is the largest drug store in the US (world?). Something </a:t>
-            </a:r>
-            <a:r>
-              <a:rPr lang="en-US" i="1" dirty="0" err="1" smtClean="0"/>
-              <a:t>something</a:t>
-            </a:r>
-            <a:r>
-              <a:rPr lang="en-US" i="1" dirty="0" smtClean="0"/>
-              <a:t>, growth is flattening, and new stores is the easier way to grow revenue.</a:t>
-            </a:r>
-          </a:p>
-          <a:p>
-            <a:r>
-              <a:rPr lang="en-US" i="1" dirty="0" smtClean="0"/>
-              <a:t>How </a:t>
-            </a:r>
-            <a:r>
-              <a:rPr lang="en-US" i="1" dirty="0"/>
-              <a:t>does CVS decide where to place stores? and what untapped markets exist for store location?</a:t>
-            </a:r>
-            <a:endParaRPr lang="en-US" i="1" dirty="0" smtClean="0"/>
-          </a:p>
-          <a:p>
+            <a:endParaRPr lang="en-US" b="1" dirty="0" smtClean="0"/>
+          </a:p>
+          <a:p>
+            <a:r>
+              <a:rPr lang="en-US" b="1" dirty="0" smtClean="0"/>
+              <a:t>Problem Statement:</a:t>
+            </a:r>
+          </a:p>
+          <a:p>
+            <a:pPr lvl="1"/>
             <a:r>
               <a:rPr lang="en-US" dirty="0" smtClean="0"/>
-              <a:t>Objective of the problem statement is clearly defined and demonstrates a value proposition. The data collected is relevant to answering the question asked.</a:t>
-            </a:r>
-            <a:endParaRPr lang="en-US" dirty="0"/>
+              <a:t>Brick-and-mortar stores are a great way to increase revenue, but CVS is running out of new places to open stores.</a:t>
+            </a:r>
+          </a:p>
+          <a:p>
+            <a:endParaRPr lang="en-US" b="1" dirty="0" smtClean="0"/>
+          </a:p>
+          <a:p>
+            <a:r>
+              <a:rPr lang="en-US" b="1" dirty="0" smtClean="0"/>
+              <a:t>Value Proposition:</a:t>
+            </a:r>
+            <a:endParaRPr lang="en-US" b="1" dirty="0" smtClean="0"/>
+          </a:p>
+          <a:p>
+            <a:pPr lvl="1"/>
+            <a:r>
+              <a:rPr lang="en-US" dirty="0" smtClean="0"/>
+              <a:t>CVS can identify new store locations by comparing current locations with </a:t>
+            </a:r>
+            <a:r>
+              <a:rPr lang="en-US" dirty="0" smtClean="0"/>
+              <a:t>regional </a:t>
+            </a:r>
+            <a:r>
+              <a:rPr lang="en-US" dirty="0" smtClean="0"/>
+              <a:t>population data.</a:t>
+            </a:r>
+            <a:endParaRPr lang="en-US" dirty="0" smtClean="0"/>
+          </a:p>
+        </p:txBody>
+      </p:sp>
+      <p:sp>
+        <p:nvSpPr>
+          <p:cNvPr id="4" name="Slide Number Placeholder 3"/>
+          <p:cNvSpPr>
+            <a:spLocks noGrp="1"/>
+          </p:cNvSpPr>
+          <p:nvPr>
+            <p:ph type="sldNum" sz="quarter" idx="12"/>
+          </p:nvPr>
+        </p:nvSpPr>
+        <p:spPr/>
+        <p:txBody>
+          <a:bodyPr/>
+          <a:lstStyle/>
+          <a:p>
+            <a:fld id="{BF6D4B1F-8553-483E-A902-D322D1246890}" type="slidenum">
+              <a:rPr lang="en-US" smtClean="0"/>
+              <a:t>3</a:t>
+            </a:fld>
+            <a:endParaRPr lang="en-US"/>
           </a:p>
         </p:txBody>
       </p:sp>
@@ -3543,6 +4507,13 @@
   <p:clrMapOvr>
     <a:masterClrMapping/>
   </p:clrMapOvr>
+  <p:timing>
+    <p:tnLst>
+      <p:par>
+        <p:cTn id="1" dur="indefinite" restart="never" nodeType="tmRoot"/>
+      </p:par>
+    </p:tnLst>
+  </p:timing>
 </p:sld>
 </file>
 
@@ -3580,7 +4551,7 @@
           <a:p>
             <a:r>
               <a:rPr lang="en-US" dirty="0" smtClean="0"/>
-              <a:t>CVS Locations by State</a:t>
+              <a:t>Data Gathering</a:t>
             </a:r>
             <a:endParaRPr lang="en-US" dirty="0"/>
           </a:p>
@@ -3588,12 +4559,12 @@
       </p:sp>
       <p:sp>
         <p:nvSpPr>
-          <p:cNvPr id="3" name="Content Placeholder 2"/>
-          <p:cNvSpPr>
-            <a:spLocks noGrp="1"/>
-          </p:cNvSpPr>
-          <p:nvPr>
-            <p:ph idx="1"/>
+          <p:cNvPr id="5" name="Text Placeholder 4"/>
+          <p:cNvSpPr>
+            <a:spLocks noGrp="1"/>
+          </p:cNvSpPr>
+          <p:nvPr>
+            <p:ph type="body" idx="1"/>
           </p:nvPr>
         </p:nvSpPr>
         <p:spPr/>
@@ -3603,55 +4574,126 @@
           <a:p>
             <a:r>
               <a:rPr lang="en-US" dirty="0" smtClean="0"/>
-              <a:t>Graph of </a:t>
-            </a:r>
-            <a:r>
-              <a:rPr lang="en-US" dirty="0" err="1" smtClean="0"/>
-              <a:t>trendline</a:t>
-            </a:r>
-            <a:endParaRPr lang="en-US" dirty="0" smtClean="0"/>
-          </a:p>
+              <a:t>CVS Store Locations online:</a:t>
+            </a:r>
+          </a:p>
+        </p:txBody>
+      </p:sp>
+      <p:sp>
+        <p:nvSpPr>
+          <p:cNvPr id="6" name="Text Placeholder 5"/>
+          <p:cNvSpPr>
+            <a:spLocks noGrp="1"/>
+          </p:cNvSpPr>
+          <p:nvPr>
+            <p:ph type="body" sz="quarter" idx="3"/>
+          </p:nvPr>
+        </p:nvSpPr>
+        <p:spPr/>
+        <p:txBody>
+          <a:bodyPr/>
+          <a:lstStyle/>
           <a:p>
             <a:r>
               <a:rPr lang="en-US" dirty="0" smtClean="0"/>
-              <a:t>List of states below </a:t>
-            </a:r>
-            <a:r>
-              <a:rPr lang="en-US" dirty="0" err="1" smtClean="0"/>
-              <a:t>trendline</a:t>
-            </a:r>
-            <a:endParaRPr lang="en-US" dirty="0" smtClean="0"/>
-          </a:p>
-          <a:p>
+              <a:t>US Census data online:</a:t>
+            </a:r>
             <a:endParaRPr lang="en-US" dirty="0"/>
           </a:p>
-          <a:p>
-            <a:r>
-              <a:rPr lang="en-US" dirty="0" smtClean="0"/>
-              <a:t>Bar graph of difference from expected</a:t>
-            </a:r>
-          </a:p>
-          <a:p>
-            <a:r>
-              <a:rPr lang="en-US" dirty="0" smtClean="0"/>
-              <a:t>Highlight top 10, bottom 10</a:t>
-            </a:r>
-          </a:p>
-          <a:p>
-            <a:endParaRPr lang="en-US" dirty="0"/>
+        </p:txBody>
+      </p:sp>
+      <p:pic>
+        <p:nvPicPr>
+          <p:cNvPr id="8" name="Content Placeholder 7"/>
+          <p:cNvPicPr>
+            <a:picLocks noGrp="1" noChangeAspect="1"/>
+          </p:cNvPicPr>
+          <p:nvPr>
+            <p:ph sz="half" idx="2"/>
+          </p:nvPr>
+        </p:nvPicPr>
+        <p:blipFill>
+          <a:blip r:embed="rId2"/>
+          <a:stretch>
+            <a:fillRect/>
+          </a:stretch>
+        </p:blipFill>
+        <p:spPr>
+          <a:xfrm>
+            <a:off x="839788" y="2713787"/>
+            <a:ext cx="5157787" cy="3267164"/>
+          </a:xfrm>
+          <a:prstGeom prst="rect">
+            <a:avLst/>
+          </a:prstGeom>
+        </p:spPr>
+      </p:pic>
+      <p:pic>
+        <p:nvPicPr>
+          <p:cNvPr id="11" name="Content Placeholder 10"/>
+          <p:cNvPicPr>
+            <a:picLocks noGrp="1" noChangeAspect="1"/>
+          </p:cNvPicPr>
+          <p:nvPr>
+            <p:ph sz="quarter" idx="4"/>
+          </p:nvPr>
+        </p:nvPicPr>
+        <p:blipFill>
+          <a:blip r:embed="rId3"/>
+          <a:stretch>
+            <a:fillRect/>
+          </a:stretch>
+        </p:blipFill>
+        <p:spPr>
+          <a:xfrm>
+            <a:off x="6172200" y="2625570"/>
+            <a:ext cx="5183188" cy="3443597"/>
+          </a:xfrm>
+          <a:prstGeom prst="rect">
+            <a:avLst/>
+          </a:prstGeom>
+        </p:spPr>
+      </p:pic>
+      <p:sp>
+        <p:nvSpPr>
+          <p:cNvPr id="12" name="Slide Number Placeholder 11"/>
+          <p:cNvSpPr>
+            <a:spLocks noGrp="1"/>
+          </p:cNvSpPr>
+          <p:nvPr>
+            <p:ph type="sldNum" sz="quarter" idx="12"/>
+          </p:nvPr>
+        </p:nvSpPr>
+        <p:spPr/>
+        <p:txBody>
+          <a:bodyPr/>
+          <a:lstStyle/>
+          <a:p>
+            <a:fld id="{BF6D4B1F-8553-483E-A902-D322D1246890}" type="slidenum">
+              <a:rPr lang="en-US" smtClean="0"/>
+              <a:t>4</a:t>
+            </a:fld>
+            <a:endParaRPr lang="en-US"/>
           </a:p>
         </p:txBody>
       </p:sp>
     </p:spTree>
     <p:extLst>
       <p:ext uri="{BB962C8B-B14F-4D97-AF65-F5344CB8AC3E}">
-        <p14:creationId xmlns:p14="http://schemas.microsoft.com/office/powerpoint/2010/main" val="3159469946"/>
+        <p14:creationId xmlns:p14="http://schemas.microsoft.com/office/powerpoint/2010/main" val="3926673733"/>
       </p:ext>
     </p:extLst>
   </p:cSld>
   <p:clrMapOvr>
     <a:masterClrMapping/>
   </p:clrMapOvr>
+  <p:timing>
+    <p:tnLst>
+      <p:par>
+        <p:cTn id="1" dur="indefinite" restart="never" nodeType="tmRoot"/>
+      </p:par>
+    </p:tnLst>
+  </p:timing>
 </p:sld>
 </file>
 
@@ -3689,7 +4731,7 @@
           <a:p>
             <a:r>
               <a:rPr lang="en-US" dirty="0" smtClean="0"/>
-              <a:t>CVS Locations by City</a:t>
+              <a:t>Data Analysis</a:t>
             </a:r>
             <a:endParaRPr lang="en-US" dirty="0"/>
           </a:p>
@@ -3697,7 +4739,7 @@
       </p:sp>
       <p:sp>
         <p:nvSpPr>
-          <p:cNvPr id="3" name="Content Placeholder 2"/>
+          <p:cNvPr id="8" name="Content Placeholder 7"/>
           <p:cNvSpPr>
             <a:spLocks noGrp="1"/>
           </p:cNvSpPr>
@@ -3705,35 +4747,118 @@
             <p:ph idx="1"/>
           </p:nvPr>
         </p:nvSpPr>
-        <p:spPr/>
+        <p:spPr>
+          <a:xfrm>
+            <a:off x="838200" y="1825625"/>
+            <a:ext cx="5163207" cy="4351338"/>
+          </a:xfrm>
+        </p:spPr>
         <p:txBody>
           <a:bodyPr/>
           <a:lstStyle/>
           <a:p>
             <a:r>
               <a:rPr lang="en-US" dirty="0" smtClean="0"/>
-              <a:t>Bar graph of difference from expected</a:t>
-            </a:r>
+              <a:t>States were grouped based on number of stores  per person</a:t>
+            </a:r>
+          </a:p>
+          <a:p>
+            <a:endParaRPr lang="en-US" dirty="0" smtClean="0"/>
           </a:p>
           <a:p>
             <a:r>
               <a:rPr lang="en-US" dirty="0" smtClean="0"/>
-              <a:t>Highlight top 10, bottom 10</a:t>
-            </a:r>
+              <a:t>On average,</a:t>
+            </a:r>
+            <a:br>
+              <a:rPr lang="en-US" dirty="0" smtClean="0"/>
+            </a:br>
+            <a:r>
+              <a:rPr lang="en-US" dirty="0" smtClean="0"/>
+              <a:t>   one store per 33,000 people</a:t>
+            </a:r>
+          </a:p>
+          <a:p>
             <a:endParaRPr lang="en-US" dirty="0"/>
+          </a:p>
+          <a:p>
+            <a:r>
+              <a:rPr lang="en-US" dirty="0" smtClean="0"/>
+              <a:t>Some states are way below the average</a:t>
+            </a:r>
+          </a:p>
+        </p:txBody>
+      </p:sp>
+      <p:pic>
+        <p:nvPicPr>
+          <p:cNvPr id="4" name="Picture 3"/>
+          <p:cNvPicPr>
+            <a:picLocks noChangeAspect="1"/>
+          </p:cNvPicPr>
+          <p:nvPr/>
+        </p:nvPicPr>
+        <p:blipFill>
+          <a:blip r:embed="rId2">
+            <a:extLst>
+              <a:ext uri="{28A0092B-C50C-407E-A947-70E740481C1C}">
+                <a14:useLocalDpi xmlns:a14="http://schemas.microsoft.com/office/drawing/2010/main" val="0"/>
+              </a:ext>
+            </a:extLst>
+          </a:blip>
+          <a:stretch>
+            <a:fillRect/>
+          </a:stretch>
+        </p:blipFill>
+        <p:spPr>
+          <a:xfrm>
+            <a:off x="6531029" y="1220186"/>
+            <a:ext cx="5209025" cy="5209025"/>
+          </a:xfrm>
+          <a:prstGeom prst="rect">
+            <a:avLst/>
+          </a:prstGeom>
+        </p:spPr>
+      </p:pic>
+      <p:sp>
+        <p:nvSpPr>
+          <p:cNvPr id="9" name="Slide Number Placeholder 8"/>
+          <p:cNvSpPr>
+            <a:spLocks noGrp="1"/>
+          </p:cNvSpPr>
+          <p:nvPr>
+            <p:ph type="sldNum" sz="quarter" idx="12"/>
+          </p:nvPr>
+        </p:nvSpPr>
+        <p:spPr/>
+        <p:txBody>
+          <a:bodyPr/>
+          <a:lstStyle/>
+          <a:p>
+            <a:fld id="{BF6D4B1F-8553-483E-A902-D322D1246890}" type="slidenum">
+              <a:rPr lang="en-US" smtClean="0"/>
+              <a:t>5</a:t>
+            </a:fld>
+            <a:endParaRPr lang="en-US"/>
           </a:p>
         </p:txBody>
       </p:sp>
     </p:spTree>
     <p:extLst>
       <p:ext uri="{BB962C8B-B14F-4D97-AF65-F5344CB8AC3E}">
-        <p14:creationId xmlns:p14="http://schemas.microsoft.com/office/powerpoint/2010/main" val="3645028420"/>
+        <p14:creationId xmlns:p14="http://schemas.microsoft.com/office/powerpoint/2010/main" val="3159469946"/>
       </p:ext>
     </p:extLst>
   </p:cSld>
   <p:clrMapOvr>
     <a:masterClrMapping/>
   </p:clrMapOvr>
+  <p:timing>
+    <p:tnLst>
+      <p:par>
+        <p:cTn id="1" dur="indefinite" restart="never" nodeType="tmRoot"/>
+      </p:par>
+    </p:tnLst>
+  </p:timing>
 </p:sld>
 </file>
 
@@ -3771,7 +4896,7 @@
           <a:p>
             <a:r>
               <a:rPr lang="en-US" dirty="0" smtClean="0"/>
-              <a:t>CVS Locations by city and state</a:t>
+              <a:t>Data Analysis</a:t>
             </a:r>
             <a:endParaRPr lang="en-US" dirty="0"/>
           </a:p>
@@ -3787,35 +4912,101 @@
             <p:ph idx="1"/>
           </p:nvPr>
         </p:nvSpPr>
-        <p:spPr/>
+        <p:spPr>
+          <a:xfrm>
+            <a:off x="838200" y="1825625"/>
+            <a:ext cx="5068614" cy="4351338"/>
+          </a:xfrm>
+        </p:spPr>
         <p:txBody>
           <a:bodyPr/>
           <a:lstStyle/>
           <a:p>
             <a:r>
               <a:rPr lang="en-US" dirty="0" smtClean="0"/>
-              <a:t>scatter plot of state under vs city under</a:t>
-            </a:r>
-          </a:p>
-          <a:p>
+              <a:t>Stores were grouped by:</a:t>
+            </a:r>
+          </a:p>
+          <a:p>
+            <a:pPr lvl="1"/>
             <a:r>
               <a:rPr lang="en-US" dirty="0" smtClean="0"/>
-              <a:t>Color y&gt;x and y&lt;x to show expanding in current cities vs expanding in new cities, respectively</a:t>
+              <a:t>Higher than average number of stores per person (green)</a:t>
+            </a:r>
+          </a:p>
+          <a:p>
+            <a:pPr lvl="1"/>
+            <a:r>
+              <a:rPr lang="en-US" dirty="0" smtClean="0"/>
+              <a:t>Lower than average (red)</a:t>
             </a:r>
             <a:endParaRPr lang="en-US" dirty="0"/>
+          </a:p>
+        </p:txBody>
+      </p:sp>
+      <p:pic>
+        <p:nvPicPr>
+          <p:cNvPr id="4" name="Picture 3"/>
+          <p:cNvPicPr>
+            <a:picLocks noChangeAspect="1"/>
+          </p:cNvPicPr>
+          <p:nvPr/>
+        </p:nvPicPr>
+        <p:blipFill rotWithShape="1">
+          <a:blip r:embed="rId2"/>
+          <a:srcRect t="251"/>
+          <a:stretch/>
+        </p:blipFill>
+        <p:spPr>
+          <a:xfrm>
+            <a:off x="6173678" y="1746942"/>
+            <a:ext cx="5272088" cy="4508704"/>
+          </a:xfrm>
+          <a:prstGeom prst="rect">
+            <a:avLst/>
+          </a:prstGeom>
+        </p:spPr>
+      </p:pic>
+      <p:sp>
+        <p:nvSpPr>
+          <p:cNvPr id="6" name="Slide Number Placeholder 5"/>
+          <p:cNvSpPr>
+            <a:spLocks noGrp="1"/>
+          </p:cNvSpPr>
+          <p:nvPr>
+            <p:ph type="sldNum" sz="quarter" idx="12"/>
+          </p:nvPr>
+        </p:nvSpPr>
+        <p:spPr/>
+        <p:txBody>
+          <a:bodyPr/>
+          <a:lstStyle/>
+          <a:p>
+            <a:fld id="{BF6D4B1F-8553-483E-A902-D322D1246890}" type="slidenum">
+              <a:rPr lang="en-US" smtClean="0"/>
+              <a:t>6</a:t>
+            </a:fld>
+            <a:endParaRPr lang="en-US"/>
           </a:p>
         </p:txBody>
       </p:sp>
     </p:spTree>
     <p:extLst>
       <p:ext uri="{BB962C8B-B14F-4D97-AF65-F5344CB8AC3E}">
-        <p14:creationId xmlns:p14="http://schemas.microsoft.com/office/powerpoint/2010/main" val="776094643"/>
+        <p14:creationId xmlns:p14="http://schemas.microsoft.com/office/powerpoint/2010/main" val="31110054"/>
       </p:ext>
     </p:extLst>
   </p:cSld>
   <p:clrMapOvr>
     <a:masterClrMapping/>
   </p:clrMapOvr>
+  <p:timing>
+    <p:tnLst>
+      <p:par>
+        <p:cTn id="1" dur="indefinite" restart="never" nodeType="tmRoot"/>
+      </p:par>
+    </p:tnLst>
+  </p:timing>
 </p:sld>
 </file>
 
@@ -3853,7 +5044,11 @@
           <a:p>
             <a:r>
               <a:rPr lang="en-US" dirty="0" smtClean="0"/>
-              <a:t>Competitor Analysis</a:t>
+              <a:t>Dat</a:t>
+            </a:r>
+            <a:r>
+              <a:rPr lang="en-US" dirty="0" smtClean="0"/>
+              <a:t>a Analysis</a:t>
             </a:r>
             <a:endParaRPr lang="en-US" dirty="0"/>
           </a:p>
@@ -3869,35 +5064,112 @@
             <p:ph idx="1"/>
           </p:nvPr>
         </p:nvSpPr>
-        <p:spPr/>
+        <p:spPr>
+          <a:xfrm>
+            <a:off x="838200" y="1825625"/>
+            <a:ext cx="5236779" cy="4351338"/>
+          </a:xfrm>
+        </p:spPr>
         <p:txBody>
           <a:bodyPr/>
           <a:lstStyle/>
           <a:p>
             <a:r>
               <a:rPr lang="en-US" dirty="0" smtClean="0"/>
-              <a:t>Walgreens facts</a:t>
-            </a:r>
-          </a:p>
-          <a:p>
-            <a:r>
-              <a:rPr lang="en-US" dirty="0" smtClean="0"/>
-              <a:t>Walgreens financials</a:t>
+              <a:t>Cities were group and analyzed the same way</a:t>
             </a:r>
             <a:endParaRPr lang="en-US" dirty="0"/>
+          </a:p>
+        </p:txBody>
+      </p:sp>
+      <p:pic>
+        <p:nvPicPr>
+          <p:cNvPr id="4" name="Picture 3"/>
+          <p:cNvPicPr>
+            <a:picLocks noChangeAspect="1"/>
+          </p:cNvPicPr>
+          <p:nvPr/>
+        </p:nvPicPr>
+        <p:blipFill>
+          <a:blip r:embed="rId2"/>
+          <a:stretch>
+            <a:fillRect/>
+          </a:stretch>
+        </p:blipFill>
+        <p:spPr>
+          <a:xfrm>
+            <a:off x="1522438" y="2942660"/>
+            <a:ext cx="3868301" cy="3626087"/>
+          </a:xfrm>
+          <a:prstGeom prst="rect">
+            <a:avLst/>
+          </a:prstGeom>
+        </p:spPr>
+      </p:pic>
+      <p:pic>
+        <p:nvPicPr>
+          <p:cNvPr id="5" name="Picture 4"/>
+          <p:cNvPicPr>
+            <a:picLocks noChangeAspect="1"/>
+          </p:cNvPicPr>
+          <p:nvPr/>
+        </p:nvPicPr>
+        <p:blipFill>
+          <a:blip r:embed="rId3"/>
+          <a:stretch>
+            <a:fillRect/>
+          </a:stretch>
+        </p:blipFill>
+        <p:spPr>
+          <a:xfrm>
+            <a:off x="6306517" y="1562264"/>
+            <a:ext cx="5389403" cy="4878059"/>
+          </a:xfrm>
+          <a:prstGeom prst="rect">
+            <a:avLst/>
+          </a:prstGeom>
+        </p:spPr>
+      </p:pic>
+      <p:sp>
+        <p:nvSpPr>
+          <p:cNvPr id="6" name="Slide Number Placeholder 5"/>
+          <p:cNvSpPr>
+            <a:spLocks noGrp="1"/>
+          </p:cNvSpPr>
+          <p:nvPr>
+            <p:ph type="sldNum" sz="quarter" idx="12"/>
+          </p:nvPr>
+        </p:nvSpPr>
+        <p:spPr/>
+        <p:txBody>
+          <a:bodyPr/>
+          <a:lstStyle/>
+          <a:p>
+            <a:fld id="{BF6D4B1F-8553-483E-A902-D322D1246890}" type="slidenum">
+              <a:rPr lang="en-US" smtClean="0"/>
+              <a:t>7</a:t>
+            </a:fld>
+            <a:endParaRPr lang="en-US"/>
           </a:p>
         </p:txBody>
       </p:sp>
     </p:spTree>
     <p:extLst>
       <p:ext uri="{BB962C8B-B14F-4D97-AF65-F5344CB8AC3E}">
-        <p14:creationId xmlns:p14="http://schemas.microsoft.com/office/powerpoint/2010/main" val="3549639268"/>
+        <p14:creationId xmlns:p14="http://schemas.microsoft.com/office/powerpoint/2010/main" val="3645028420"/>
       </p:ext>
     </p:extLst>
   </p:cSld>
   <p:clrMapOvr>
     <a:masterClrMapping/>
   </p:clrMapOvr>
+  <p:timing>
+    <p:tnLst>
+      <p:par>
+        <p:cTn id="1" dur="indefinite" restart="never" nodeType="tmRoot"/>
+      </p:par>
+    </p:tnLst>
+  </p:timing>
 </p:sld>
 </file>
 
@@ -3935,7 +5207,7 @@
           <a:p>
             <a:r>
               <a:rPr lang="en-US" dirty="0" smtClean="0"/>
-              <a:t>Competitor Analysis</a:t>
+              <a:t>Data Analysis</a:t>
             </a:r>
             <a:endParaRPr lang="en-US" dirty="0"/>
           </a:p>
@@ -3951,37 +5223,103 @@
             <p:ph idx="1"/>
           </p:nvPr>
         </p:nvSpPr>
-        <p:spPr/>
+        <p:spPr>
+          <a:xfrm>
+            <a:off x="838200" y="1825625"/>
+            <a:ext cx="4385442" cy="4351338"/>
+          </a:xfrm>
+        </p:spPr>
         <p:txBody>
           <a:bodyPr/>
           <a:lstStyle/>
           <a:p>
             <a:r>
               <a:rPr lang="en-US" dirty="0" smtClean="0"/>
-              <a:t>Highlight cities where </a:t>
-            </a:r>
-            <a:r>
-              <a:rPr lang="en-US" dirty="0" err="1" smtClean="0"/>
-              <a:t>walgreens</a:t>
-            </a:r>
+              <a:t>Assumption: lower than average number of stores equates to higher demand</a:t>
+            </a:r>
+          </a:p>
+          <a:p>
+            <a:endParaRPr lang="en-US" dirty="0" smtClean="0"/>
+          </a:p>
+          <a:p>
             <a:r>
               <a:rPr lang="en-US" dirty="0" smtClean="0"/>
-              <a:t> has less than expected presence</a:t>
-            </a:r>
-            <a:endParaRPr lang="en-US" dirty="0"/>
+              <a:t>States were grouped a second time based demand for CVS in cities </a:t>
+            </a:r>
+            <a:br>
+              <a:rPr lang="en-US" dirty="0" smtClean="0"/>
+            </a:br>
+            <a:r>
+              <a:rPr lang="en-US" dirty="0" smtClean="0"/>
+              <a:t>vs the state</a:t>
+            </a:r>
+          </a:p>
+        </p:txBody>
+      </p:sp>
+      <p:pic>
+        <p:nvPicPr>
+          <p:cNvPr id="5" name="Picture 4"/>
+          <p:cNvPicPr>
+            <a:picLocks noChangeAspect="1"/>
+          </p:cNvPicPr>
+          <p:nvPr/>
+        </p:nvPicPr>
+        <p:blipFill>
+          <a:blip r:embed="rId2"/>
+          <a:stretch>
+            <a:fillRect/>
+          </a:stretch>
+        </p:blipFill>
+        <p:spPr>
+          <a:xfrm>
+            <a:off x="5888420" y="1825625"/>
+            <a:ext cx="5465380" cy="4136214"/>
+          </a:xfrm>
+          <a:prstGeom prst="rect">
+            <a:avLst/>
+          </a:prstGeom>
+        </p:spPr>
+      </p:pic>
+      <p:sp>
+        <p:nvSpPr>
+          <p:cNvPr id="7" name="Slide Number Placeholder 6"/>
+          <p:cNvSpPr>
+            <a:spLocks noGrp="1"/>
+          </p:cNvSpPr>
+          <p:nvPr>
+            <p:ph type="sldNum" sz="quarter" idx="12"/>
+          </p:nvPr>
+        </p:nvSpPr>
+        <p:spPr/>
+        <p:txBody>
+          <a:bodyPr/>
+          <a:lstStyle/>
+          <a:p>
+            <a:fld id="{BF6D4B1F-8553-483E-A902-D322D1246890}" type="slidenum">
+              <a:rPr lang="en-US" smtClean="0"/>
+              <a:t>8</a:t>
+            </a:fld>
+            <a:endParaRPr lang="en-US"/>
           </a:p>
         </p:txBody>
       </p:sp>
     </p:spTree>
     <p:extLst>
       <p:ext uri="{BB962C8B-B14F-4D97-AF65-F5344CB8AC3E}">
-        <p14:creationId xmlns:p14="http://schemas.microsoft.com/office/powerpoint/2010/main" val="2836903766"/>
+        <p14:creationId xmlns:p14="http://schemas.microsoft.com/office/powerpoint/2010/main" val="776094643"/>
       </p:ext>
     </p:extLst>
   </p:cSld>
   <p:clrMapOvr>
     <a:masterClrMapping/>
   </p:clrMapOvr>
+  <p:timing>
+    <p:tnLst>
+      <p:par>
+        <p:cTn id="1" dur="indefinite" restart="never" nodeType="tmRoot"/>
+      </p:par>
+    </p:tnLst>
+  </p:timing>
 </p:sld>
 </file>
 
@@ -4018,54 +5356,432 @@
           <a:lstStyle/>
           <a:p>
             <a:r>
-              <a:rPr lang="en-US" b="1" dirty="0"/>
-              <a:t>Tools </a:t>
-            </a:r>
-            <a:r>
-              <a:rPr lang="en-US" b="1" dirty="0" smtClean="0"/>
-              <a:t>and Methods</a:t>
+              <a:rPr lang="en-US" dirty="0" smtClean="0"/>
+              <a:t>Results</a:t>
             </a:r>
             <a:endParaRPr lang="en-US" dirty="0"/>
           </a:p>
         </p:txBody>
       </p:sp>
-      <p:sp>
-        <p:nvSpPr>
-          <p:cNvPr id="3" name="Content Placeholder 2"/>
-          <p:cNvSpPr>
-            <a:spLocks noGrp="1"/>
-          </p:cNvSpPr>
-          <p:nvPr>
-            <p:ph idx="1"/>
-          </p:nvPr>
-        </p:nvSpPr>
-        <p:spPr/>
-        <p:txBody>
-          <a:bodyPr/>
-          <a:lstStyle/>
-          <a:p>
-            <a:r>
-              <a:rPr lang="en-US" dirty="0" smtClean="0"/>
-              <a:t>Demonstrates correct usage of tools and methods learned in the coursework and selects those appropriate to solve tasks at hand. Data is collected using a reasonable approach with one or more of the technologies learned in the coursework.</a:t>
-            </a:r>
-            <a:endParaRPr lang="en-US" dirty="0"/>
+      <p:pic>
+        <p:nvPicPr>
+          <p:cNvPr id="5" name="Picture 4"/>
+          <p:cNvPicPr>
+            <a:picLocks noChangeAspect="1"/>
+          </p:cNvPicPr>
+          <p:nvPr/>
+        </p:nvPicPr>
+        <p:blipFill>
+          <a:blip r:embed="rId2"/>
+          <a:stretch>
+            <a:fillRect/>
+          </a:stretch>
+        </p:blipFill>
+        <p:spPr>
+          <a:xfrm>
+            <a:off x="993227" y="1690688"/>
+            <a:ext cx="5302470" cy="4363491"/>
+          </a:xfrm>
+          <a:prstGeom prst="rect">
+            <a:avLst/>
+          </a:prstGeom>
+        </p:spPr>
+      </p:pic>
+      <p:pic>
+        <p:nvPicPr>
+          <p:cNvPr id="7" name="Picture 6"/>
+          <p:cNvPicPr>
+            <a:picLocks noChangeAspect="1"/>
+          </p:cNvPicPr>
+          <p:nvPr/>
+        </p:nvPicPr>
+        <p:blipFill>
+          <a:blip r:embed="rId3"/>
+          <a:stretch>
+            <a:fillRect/>
+          </a:stretch>
+        </p:blipFill>
+        <p:spPr>
+          <a:xfrm>
+            <a:off x="7886981" y="2357631"/>
+            <a:ext cx="3466819" cy="3696548"/>
+          </a:xfrm>
+          <a:prstGeom prst="rect">
+            <a:avLst/>
+          </a:prstGeom>
+        </p:spPr>
+      </p:pic>
+      <p:sp>
+        <p:nvSpPr>
+          <p:cNvPr id="8" name="TextBox 7"/>
+          <p:cNvSpPr txBox="1"/>
+          <p:nvPr/>
+        </p:nvSpPr>
+        <p:spPr>
+          <a:xfrm>
+            <a:off x="7886981" y="1988299"/>
+            <a:ext cx="3466819" cy="369332"/>
+          </a:xfrm>
+          <a:prstGeom prst="rect">
+            <a:avLst/>
+          </a:prstGeom>
+          <a:solidFill>
+            <a:schemeClr val="bg1"/>
+          </a:solidFill>
+        </p:spPr>
+        <p:txBody>
+          <a:bodyPr wrap="square" rtlCol="0">
+            <a:spAutoFit/>
+          </a:bodyPr>
+          <a:lstStyle/>
+          <a:p>
+            <a:pPr algn="ctr"/>
+            <a:r>
+              <a:rPr lang="en-US" u="sng" dirty="0" smtClean="0"/>
+              <a:t>Top Cities for Store Expansion</a:t>
+            </a:r>
+            <a:endParaRPr lang="en-US" u="sng" dirty="0"/>
+          </a:p>
+        </p:txBody>
+      </p:sp>
+      <p:sp>
+        <p:nvSpPr>
+          <p:cNvPr id="9" name="TextBox 8"/>
+          <p:cNvSpPr txBox="1"/>
+          <p:nvPr/>
+        </p:nvSpPr>
+        <p:spPr>
+          <a:xfrm>
+            <a:off x="10053320" y="2357631"/>
+            <a:ext cx="1300480" cy="276999"/>
+          </a:xfrm>
+          <a:prstGeom prst="rect">
+            <a:avLst/>
+          </a:prstGeom>
+          <a:solidFill>
+            <a:schemeClr val="bg1"/>
+          </a:solidFill>
+        </p:spPr>
+        <p:txBody>
+          <a:bodyPr wrap="square" rtlCol="0">
+            <a:spAutoFit/>
+          </a:bodyPr>
+          <a:lstStyle/>
+          <a:p>
+            <a:pPr algn="ctr"/>
+            <a:r>
+              <a:rPr lang="en-US" sz="1200" b="1" dirty="0" smtClean="0"/>
+              <a:t>store_demand</a:t>
+            </a:r>
+            <a:endParaRPr lang="en-US" sz="1200" b="1" dirty="0"/>
+          </a:p>
+        </p:txBody>
+      </p:sp>
+      <p:sp>
+        <p:nvSpPr>
+          <p:cNvPr id="10" name="Slide Number Placeholder 9"/>
+          <p:cNvSpPr>
+            <a:spLocks noGrp="1"/>
+          </p:cNvSpPr>
+          <p:nvPr>
+            <p:ph type="sldNum" sz="quarter" idx="12"/>
+          </p:nvPr>
+        </p:nvSpPr>
+        <p:spPr/>
+        <p:txBody>
+          <a:bodyPr/>
+          <a:lstStyle/>
+          <a:p>
+            <a:fld id="{BF6D4B1F-8553-483E-A902-D322D1246890}" type="slidenum">
+              <a:rPr lang="en-US" smtClean="0"/>
+              <a:t>9</a:t>
+            </a:fld>
+            <a:endParaRPr lang="en-US"/>
           </a:p>
         </p:txBody>
       </p:sp>
     </p:spTree>
     <p:extLst>
       <p:ext uri="{BB962C8B-B14F-4D97-AF65-F5344CB8AC3E}">
-        <p14:creationId xmlns:p14="http://schemas.microsoft.com/office/powerpoint/2010/main" val="3918992999"/>
+        <p14:creationId xmlns:p14="http://schemas.microsoft.com/office/powerpoint/2010/main" val="3852057388"/>
       </p:ext>
     </p:extLst>
   </p:cSld>
   <p:clrMapOvr>
     <a:masterClrMapping/>
   </p:clrMapOvr>
+  <p:timing>
+    <p:tnLst>
+      <p:par>
+        <p:cTn id="1" dur="indefinite" restart="never" nodeType="tmRoot"/>
+      </p:par>
+    </p:tnLst>
+  </p:timing>
 </p:sld>
 </file>
 
 <file path=ppt/theme/theme1.xml><?xml version="1.0" encoding="utf-8"?>
+<a:theme xmlns:a="http://schemas.openxmlformats.org/drawingml/2006/main" name="Office Theme">
+  <a:themeElements>
+    <a:clrScheme name="Office">
+      <a:dk1>
+        <a:sysClr val="windowText" lastClr="000000"/>
+      </a:dk1>
+      <a:lt1>
+        <a:sysClr val="window" lastClr="FFFFFF"/>
+      </a:lt1>
+      <a:dk2>
+        <a:srgbClr val="44546A"/>
+      </a:dk2>
+      <a:lt2>
+        <a:srgbClr val="E7E6E6"/>
+      </a:lt2>
+      <a:accent1>
+        <a:srgbClr val="5B9BD5"/>
+      </a:accent1>
+      <a:accent2>
+        <a:srgbClr val="ED7D31"/>
+      </a:accent2>
+      <a:accent3>
+        <a:srgbClr val="A5A5A5"/>
+      </a:accent3>
+      <a:accent4>
+        <a:srgbClr val="FFC000"/>
+      </a:accent4>
+      <a:accent5>
+        <a:srgbClr val="4472C4"/>
+      </a:accent5>
+      <a:accent6>
+        <a:srgbClr val="70AD47"/>
+      </a:accent6>
+      <a:hlink>
+        <a:srgbClr val="0563C1"/>
+      </a:hlink>
+      <a:folHlink>
+        <a:srgbClr val="954F72"/>
+      </a:folHlink>
+    </a:clrScheme>
+    <a:fontScheme name="Corbel">
+      <a:majorFont>
+        <a:latin typeface="Corbel" panose="020B0503020204020204"/>
+        <a:ea typeface=""/>
+        <a:cs typeface=""/>
+        <a:font script="Jpan" typeface="HGｺﾞｼｯｸM"/>
+        <a:font script="Hang" typeface="HY엽서L"/>
+        <a:font script="Hans" typeface="华文楷体"/>
+        <a:font script="Hant" typeface="新細明體"/>
+        <a:font script="Arab" typeface="Tahoma"/>
+        <a:font script="Hebr" typeface="Miriam"/>
+        <a:font script="Thai" typeface="DilleniaUPC"/>
+        <a:font script="Ethi" typeface="Nyala"/>
+        <a:font script="Beng" typeface="Vrinda"/>
+        <a:font script="Gujr" typeface="Shruti"/>
+        <a:font script="Khmr" typeface="DaunPenh"/>
+        <a:font script="Knda" typeface="Tunga"/>
+        <a:font script="Guru" typeface="Raavi"/>
+        <a:font script="Cans" typeface="Euphemia"/>
+        <a:font script="Cher" typeface="Plantagenet Cherokee"/>
+        <a:font script="Yiii" typeface="Microsoft Yi Baiti"/>
+        <a:font script="Tibt" typeface="Microsoft Himalaya"/>
+        <a:font script="Thaa" typeface="MV Boli"/>
+        <a:font script="Deva" typeface="Mangal"/>
+        <a:font script="Telu" typeface="Gautami"/>
+        <a:font script="Taml" typeface="Latha"/>
+        <a:font script="Syrc" typeface="Estrangelo Edessa"/>
+        <a:font script="Orya" typeface="Kalinga"/>
+        <a:font script="Mlym" typeface="Kartika"/>
+        <a:font script="Laoo" typeface="DokChampa"/>
+        <a:font script="Sinh" typeface="Iskoola Pota"/>
+        <a:font script="Mong" typeface="Mongolian Baiti"/>
+        <a:font script="Viet" typeface="Arial"/>
+        <a:font script="Uigh" typeface="Microsoft Uighur"/>
+        <a:font script="Geor" typeface="Sylfaen"/>
+      </a:majorFont>
+      <a:minorFont>
+        <a:latin typeface="Corbel" panose="020B0503020204020204"/>
+        <a:ea typeface=""/>
+        <a:cs typeface=""/>
+        <a:font script="Jpan" typeface="HGｺﾞｼｯｸM"/>
+        <a:font script="Hang" typeface="HY엽서L"/>
+        <a:font script="Hans" typeface="华文楷体"/>
+        <a:font script="Hant" typeface="新細明體"/>
+        <a:font script="Arab" typeface="Tahoma"/>
+        <a:font script="Hebr" typeface="Miriam"/>
+        <a:font script="Thai" typeface="DilleniaUPC"/>
+        <a:font script="Ethi" typeface="Nyala"/>
+        <a:font script="Beng" typeface="Vrinda"/>
+        <a:font script="Gujr" typeface="Shruti"/>
+        <a:font script="Khmr" typeface="DaunPenh"/>
+        <a:font script="Knda" typeface="Tunga"/>
+        <a:font script="Guru" typeface="Raavi"/>
+        <a:font script="Cans" typeface="Euphemia"/>
+        <a:font script="Cher" typeface="Plantagenet Cherokee"/>
+        <a:font script="Yiii" typeface="Microsoft Yi Baiti"/>
+        <a:font script="Tibt" typeface="Microsoft Himalaya"/>
+        <a:font script="Thaa" typeface="MV Boli"/>
+        <a:font script="Deva" typeface="Mangal"/>
+        <a:font script="Telu" typeface="Gautami"/>
+        <a:font script="Taml" typeface="Latha"/>
+        <a:font script="Syrc" typeface="Estrangelo Edessa"/>
+        <a:font script="Orya" typeface="Kalinga"/>
+        <a:font script="Mlym" typeface="Kartika"/>
+        <a:font script="Laoo" typeface="DokChampa"/>
+        <a:font script="Sinh" typeface="Iskoola Pota"/>
+        <a:font script="Mong" typeface="Mongolian Baiti"/>
+        <a:font script="Viet" typeface="Arial"/>
+        <a:font script="Uigh" typeface="Microsoft Uighur"/>
+        <a:font script="Geor" typeface="Sylfaen"/>
+      </a:minorFont>
+    </a:fontScheme>
+    <a:fmtScheme name="Office">
+      <a:fillStyleLst>
+        <a:solidFill>
+          <a:schemeClr val="phClr"/>
+        </a:solidFill>
+        <a:gradFill rotWithShape="1">
+          <a:gsLst>
+            <a:gs pos="0">
+              <a:schemeClr val="phClr">
+                <a:lumMod val="110000"/>
+                <a:satMod val="105000"/>
+                <a:tint val="67000"/>
+              </a:schemeClr>
+            </a:gs>
+            <a:gs pos="50000">
+              <a:schemeClr val="phClr">
+                <a:lumMod val="105000"/>
+                <a:satMod val="103000"/>
+                <a:tint val="73000"/>
+              </a:schemeClr>
+            </a:gs>
+            <a:gs pos="100000">
+              <a:schemeClr val="phClr">
+                <a:lumMod val="105000"/>
+                <a:satMod val="109000"/>
+                <a:tint val="81000"/>
+              </a:schemeClr>
+            </a:gs>
+          </a:gsLst>
+          <a:lin ang="5400000" scaled="0"/>
+        </a:gradFill>
+        <a:gradFill rotWithShape="1">
+          <a:gsLst>
+            <a:gs pos="0">
+              <a:schemeClr val="phClr">
+                <a:satMod val="103000"/>
+                <a:lumMod val="102000"/>
+                <a:tint val="94000"/>
+              </a:schemeClr>
+            </a:gs>
+            <a:gs pos="50000">
+              <a:schemeClr val="phClr">
+                <a:satMod val="110000"/>
+                <a:lumMod val="100000"/>
+                <a:shade val="100000"/>
+              </a:schemeClr>
+            </a:gs>
+            <a:gs pos="100000">
+              <a:schemeClr val="phClr">
+                <a:lumMod val="99000"/>
+                <a:satMod val="120000"/>
+                <a:shade val="78000"/>
+              </a:schemeClr>
+            </a:gs>
+          </a:gsLst>
+          <a:lin ang="5400000" scaled="0"/>
+        </a:gradFill>
+      </a:fillStyleLst>
+      <a:lnStyleLst>
+        <a:ln w="6350" cap="flat" cmpd="sng" algn="ctr">
+          <a:solidFill>
+            <a:schemeClr val="phClr"/>
+          </a:solidFill>
+          <a:prstDash val="solid"/>
+          <a:miter lim="800000"/>
+        </a:ln>
+        <a:ln w="12700" cap="flat" cmpd="sng" algn="ctr">
+          <a:solidFill>
+            <a:schemeClr val="phClr"/>
+          </a:solidFill>
+          <a:prstDash val="solid"/>
+          <a:miter lim="800000"/>
+        </a:ln>
+        <a:ln w="19050" cap="flat" cmpd="sng" algn="ctr">
+          <a:solidFill>
+            <a:schemeClr val="phClr"/>
+          </a:solidFill>
+          <a:prstDash val="solid"/>
+          <a:miter lim="800000"/>
+        </a:ln>
+      </a:lnStyleLst>
+      <a:effectStyleLst>
+        <a:effectStyle>
+          <a:effectLst/>
+        </a:effectStyle>
+        <a:effectStyle>
+          <a:effectLst/>
+        </a:effectStyle>
+        <a:effectStyle>
+          <a:effectLst>
+            <a:outerShdw blurRad="57150" dist="19050" dir="5400000" algn="ctr" rotWithShape="0">
+              <a:srgbClr val="000000">
+                <a:alpha val="63000"/>
+              </a:srgbClr>
+            </a:outerShdw>
+          </a:effectLst>
+        </a:effectStyle>
+      </a:effectStyleLst>
+      <a:bgFillStyleLst>
+        <a:solidFill>
+          <a:schemeClr val="phClr"/>
+        </a:solidFill>
+        <a:solidFill>
+          <a:schemeClr val="phClr">
+            <a:tint val="95000"/>
+            <a:satMod val="170000"/>
+          </a:schemeClr>
+        </a:solidFill>
+        <a:gradFill rotWithShape="1">
+          <a:gsLst>
+            <a:gs pos="0">
+              <a:schemeClr val="phClr">
+                <a:tint val="93000"/>
+                <a:satMod val="150000"/>
+                <a:shade val="98000"/>
+                <a:lumMod val="102000"/>
+              </a:schemeClr>
+            </a:gs>
+            <a:gs pos="50000">
+              <a:schemeClr val="phClr">
+                <a:tint val="98000"/>
+                <a:satMod val="130000"/>
+                <a:shade val="90000"/>
+                <a:lumMod val="103000"/>
+              </a:schemeClr>
+            </a:gs>
+            <a:gs pos="100000">
+              <a:schemeClr val="phClr">
+                <a:shade val="63000"/>
+                <a:satMod val="120000"/>
+              </a:schemeClr>
+            </a:gs>
+          </a:gsLst>
+          <a:lin ang="5400000" scaled="0"/>
+        </a:gradFill>
+      </a:bgFillStyleLst>
+    </a:fmtScheme>
+  </a:themeElements>
+  <a:objectDefaults/>
+  <a:extraClrSchemeLst/>
+  <a:extLst>
+    <a:ext uri="{05A4C25C-085E-4340-85A3-A5531E510DB2}">
+      <thm15:themeFamily xmlns:thm15="http://schemas.microsoft.com/office/thememl/2012/main" name="Office Theme" id="{62F939B6-93AF-4DB8-9C6B-D6C7DFDC589F}" vid="{4A3C46E8-61CC-4603-A589-7422A47A8E4A}"/>
+    </a:ext>
+  </a:extLst>
+</a:theme>
+</file>
+
+<file path=ppt/theme/theme2.xml><?xml version="1.0" encoding="utf-8"?>
 <a:theme xmlns:a="http://schemas.openxmlformats.org/drawingml/2006/main" name="Office Theme">
   <a:themeElements>
     <a:clrScheme name="Office">

</xml_diff>

<commit_message>
updated color palate on slides
</commit_message>
<xml_diff>
--- a/1-web-scraping/Web Scraping Project.pptx
+++ b/1-web-scraping/Web Scraping Project.pptx
@@ -5,7 +5,7 @@
     <p:sldMasterId id="2147483699" r:id="rId1"/>
   </p:sldMasterIdLst>
   <p:notesMasterIdLst>
-    <p:notesMasterId r:id="rId14"/>
+    <p:notesMasterId r:id="rId15"/>
   </p:notesMasterIdLst>
   <p:sldIdLst>
     <p:sldId id="256" r:id="rId2"/>
@@ -18,8 +18,9 @@
     <p:sldId id="266" r:id="rId9"/>
     <p:sldId id="271" r:id="rId10"/>
     <p:sldId id="259" r:id="rId11"/>
-    <p:sldId id="262" r:id="rId12"/>
-    <p:sldId id="267" r:id="rId13"/>
+    <p:sldId id="272" r:id="rId12"/>
+    <p:sldId id="262" r:id="rId13"/>
+    <p:sldId id="267" r:id="rId14"/>
   </p:sldIdLst>
   <p:sldSz cx="12192000" cy="6858000"/>
   <p:notesSz cx="6858000" cy="9144000"/>
@@ -208,7 +209,7 @@
           <a:p>
             <a:fld id="{B9B81A66-072D-44AF-AAC0-A53B0CDA7EB3}" type="datetimeFigureOut">
               <a:rPr lang="en-US" smtClean="0"/>
-              <a:t>7/26/2020</a:t>
+              <a:t>7/27/2020</a:t>
             </a:fld>
             <a:endParaRPr lang="en-US"/>
           </a:p>
@@ -691,7 +692,7 @@
           <a:p>
             <a:fld id="{1A4DC1D4-8F4C-4871-A2F6-2E54397244A8}" type="datetime1">
               <a:rPr lang="en-US" smtClean="0"/>
-              <a:t>7/26/2020</a:t>
+              <a:t>7/27/2020</a:t>
             </a:fld>
             <a:endParaRPr lang="en-US"/>
           </a:p>
@@ -868,7 +869,7 @@
           <a:p>
             <a:fld id="{6395F726-9BDE-45D0-A87F-F10E441A135C}" type="datetime1">
               <a:rPr lang="en-US" smtClean="0"/>
-              <a:t>7/26/2020</a:t>
+              <a:t>7/27/2020</a:t>
             </a:fld>
             <a:endParaRPr lang="en-US"/>
           </a:p>
@@ -1048,7 +1049,7 @@
           <a:p>
             <a:fld id="{281EE617-F344-46C1-ABD2-2F97B1BBC997}" type="datetime1">
               <a:rPr lang="en-US" smtClean="0"/>
-              <a:t>7/26/2020</a:t>
+              <a:t>7/27/2020</a:t>
             </a:fld>
             <a:endParaRPr lang="en-US"/>
           </a:p>
@@ -1218,7 +1219,7 @@
           <a:p>
             <a:fld id="{90A04284-0CC0-4B7F-8B66-7E5EB0581B07}" type="datetime1">
               <a:rPr lang="en-US" smtClean="0"/>
-              <a:t>7/26/2020</a:t>
+              <a:t>7/27/2020</a:t>
             </a:fld>
             <a:endParaRPr lang="en-US"/>
           </a:p>
@@ -1471,7 +1472,7 @@
           <a:p>
             <a:fld id="{AF9B3ADF-F027-4972-8B05-CC20FCB7FD88}" type="datetime1">
               <a:rPr lang="en-US" smtClean="0"/>
-              <a:t>7/26/2020</a:t>
+              <a:t>7/27/2020</a:t>
             </a:fld>
             <a:endParaRPr lang="en-US"/>
           </a:p>
@@ -1703,7 +1704,7 @@
           <a:p>
             <a:fld id="{58354E25-57CB-42F3-8CAD-A801D812F267}" type="datetime1">
               <a:rPr lang="en-US" smtClean="0"/>
-              <a:t>7/26/2020</a:t>
+              <a:t>7/27/2020</a:t>
             </a:fld>
             <a:endParaRPr lang="en-US"/>
           </a:p>
@@ -2070,7 +2071,7 @@
           <a:p>
             <a:fld id="{B84B3AD9-673D-478D-B73E-ACE97C9A13E6}" type="datetime1">
               <a:rPr lang="en-US" smtClean="0"/>
-              <a:t>7/26/2020</a:t>
+              <a:t>7/27/2020</a:t>
             </a:fld>
             <a:endParaRPr lang="en-US"/>
           </a:p>
@@ -2188,7 +2189,7 @@
           <a:p>
             <a:fld id="{5CFEE832-FA3F-413C-B995-0247E4B9F3B6}" type="datetime1">
               <a:rPr lang="en-US" smtClean="0"/>
-              <a:t>7/26/2020</a:t>
+              <a:t>7/27/2020</a:t>
             </a:fld>
             <a:endParaRPr lang="en-US"/>
           </a:p>
@@ -2283,7 +2284,7 @@
           <a:p>
             <a:fld id="{7C36E17E-BE75-44DB-BFCF-E043AC7CD59C}" type="datetime1">
               <a:rPr lang="en-US" smtClean="0"/>
-              <a:t>7/26/2020</a:t>
+              <a:t>7/27/2020</a:t>
             </a:fld>
             <a:endParaRPr lang="en-US"/>
           </a:p>
@@ -2560,7 +2561,7 @@
           <a:p>
             <a:fld id="{DA43EF33-F292-4600-8567-42F29EE63603}" type="datetime1">
               <a:rPr lang="en-US" smtClean="0"/>
-              <a:t>7/26/2020</a:t>
+              <a:t>7/27/2020</a:t>
             </a:fld>
             <a:endParaRPr lang="en-US"/>
           </a:p>
@@ -2622,7 +2623,7 @@
 </file>
 
 <file path=ppt/slideLayouts/slideLayout9.xml><?xml version="1.0" encoding="utf-8"?>
-<p:sldLayout xmlns:a="http://schemas.openxmlformats.org/drawingml/2006/main" xmlns:r="http://schemas.openxmlformats.org/officeDocument/2006/relationships" xmlns:p="http://schemas.openxmlformats.org/presentationml/2006/main" type="picTx" preserve="1">
+<p:sldLayout xmlns:a="http://schemas.openxmlformats.org/drawingml/2006/main" xmlns:r="http://schemas.openxmlformats.org/officeDocument/2006/relationships" xmlns:p="http://schemas.openxmlformats.org/presentationml/2006/main" preserve="1" userDrawn="1">
   <p:cSld name="Picture with Caption">
     <p:spTree>
       <p:nvGrpSpPr>
@@ -2651,7 +2652,7 @@
         <p:spPr>
           <a:xfrm>
             <a:off x="839788" y="457200"/>
-            <a:ext cx="3932237" cy="1600200"/>
+            <a:ext cx="3932237" cy="2055180"/>
           </a:xfrm>
         </p:spPr>
         <p:txBody>
@@ -2663,96 +2664,37 @@
           </a:lstStyle>
           <a:p>
             <a:r>
-              <a:rPr lang="en-US" smtClean="0"/>
+              <a:rPr lang="en-US" dirty="0" smtClean="0"/>
               <a:t>Click to edit Master title style</a:t>
             </a:r>
-            <a:endParaRPr lang="en-US"/>
-          </a:p>
-        </p:txBody>
-      </p:sp>
-      <p:sp>
-        <p:nvSpPr>
-          <p:cNvPr id="3" name="Picture Placeholder 2"/>
-          <p:cNvSpPr>
-            <a:spLocks noGrp="1"/>
-          </p:cNvSpPr>
-          <p:nvPr>
-            <p:ph type="pic" idx="1"/>
+            <a:endParaRPr lang="en-US" dirty="0"/>
+          </a:p>
+        </p:txBody>
+      </p:sp>
+      <p:sp>
+        <p:nvSpPr>
+          <p:cNvPr id="4" name="Text Placeholder 3"/>
+          <p:cNvSpPr>
+            <a:spLocks noGrp="1"/>
+          </p:cNvSpPr>
+          <p:nvPr>
+            <p:ph type="body" sz="half" idx="2"/>
           </p:nvPr>
         </p:nvSpPr>
         <p:spPr>
           <a:xfrm>
-            <a:off x="5183188" y="987425"/>
-            <a:ext cx="6172200" cy="4873625"/>
+            <a:off x="839788" y="3018408"/>
+            <a:ext cx="3932237" cy="2850579"/>
           </a:xfrm>
         </p:spPr>
         <p:txBody>
-          <a:bodyPr/>
+          <a:bodyPr>
+            <a:normAutofit/>
+          </a:bodyPr>
           <a:lstStyle>
             <a:lvl1pPr marL="0" indent="0">
               <a:buNone/>
-              <a:defRPr sz="3200"/>
-            </a:lvl1pPr>
-            <a:lvl2pPr marL="457200" indent="0">
-              <a:buNone/>
-              <a:defRPr sz="2800"/>
-            </a:lvl2pPr>
-            <a:lvl3pPr marL="914400" indent="0">
-              <a:buNone/>
-              <a:defRPr sz="2400"/>
-            </a:lvl3pPr>
-            <a:lvl4pPr marL="1371600" indent="0">
-              <a:buNone/>
-              <a:defRPr sz="2000"/>
-            </a:lvl4pPr>
-            <a:lvl5pPr marL="1828800" indent="0">
-              <a:buNone/>
-              <a:defRPr sz="2000"/>
-            </a:lvl5pPr>
-            <a:lvl6pPr marL="2286000" indent="0">
-              <a:buNone/>
-              <a:defRPr sz="2000"/>
-            </a:lvl6pPr>
-            <a:lvl7pPr marL="2743200" indent="0">
-              <a:buNone/>
-              <a:defRPr sz="2000"/>
-            </a:lvl7pPr>
-            <a:lvl8pPr marL="3200400" indent="0">
-              <a:buNone/>
-              <a:defRPr sz="2000"/>
-            </a:lvl8pPr>
-            <a:lvl9pPr marL="3657600" indent="0">
-              <a:buNone/>
-              <a:defRPr sz="2000"/>
-            </a:lvl9pPr>
-          </a:lstStyle>
-          <a:p>
-            <a:endParaRPr lang="en-US"/>
-          </a:p>
-        </p:txBody>
-      </p:sp>
-      <p:sp>
-        <p:nvSpPr>
-          <p:cNvPr id="4" name="Text Placeholder 3"/>
-          <p:cNvSpPr>
-            <a:spLocks noGrp="1"/>
-          </p:cNvSpPr>
-          <p:nvPr>
-            <p:ph type="body" sz="half" idx="2"/>
-          </p:nvPr>
-        </p:nvSpPr>
-        <p:spPr>
-          <a:xfrm>
-            <a:off x="839788" y="2057400"/>
-            <a:ext cx="3932237" cy="3811588"/>
-          </a:xfrm>
-        </p:spPr>
-        <p:txBody>
-          <a:bodyPr/>
-          <a:lstStyle>
-            <a:lvl1pPr marL="0" indent="0">
-              <a:buNone/>
-              <a:defRPr sz="1600"/>
+              <a:defRPr sz="1800"/>
             </a:lvl1pPr>
             <a:lvl2pPr marL="457200" indent="0">
               <a:buNone/>
@@ -2790,7 +2732,7 @@
           <a:p>
             <a:pPr lvl="0"/>
             <a:r>
-              <a:rPr lang="en-US" smtClean="0"/>
+              <a:rPr lang="en-US" dirty="0" smtClean="0"/>
               <a:t>Click to edit Master text styles</a:t>
             </a:r>
           </a:p>
@@ -2813,7 +2755,7 @@
           <a:p>
             <a:fld id="{7151DE12-2648-4BC2-A3D5-C4759A39D9B6}" type="datetime1">
               <a:rPr lang="en-US" smtClean="0"/>
-              <a:t>7/26/2020</a:t>
+              <a:t>7/27/2020</a:t>
             </a:fld>
             <a:endParaRPr lang="en-US"/>
           </a:p>
@@ -3031,7 +2973,7 @@
           <a:p>
             <a:fld id="{14C16A73-1820-4861-BAB2-EA78E8B68D30}" type="datetime1">
               <a:rPr lang="en-US" smtClean="0"/>
-              <a:t>7/26/2020</a:t>
+              <a:t>7/27/2020</a:t>
             </a:fld>
             <a:endParaRPr lang="en-US"/>
           </a:p>
@@ -3123,13 +3065,13 @@
         </p:nvCxnSpPr>
         <p:spPr>
           <a:xfrm>
-            <a:off x="294290" y="0"/>
+            <a:off x="347558" y="0"/>
             <a:ext cx="10510" cy="6858000"/>
           </a:xfrm>
           <a:prstGeom prst="line">
             <a:avLst/>
           </a:prstGeom>
-          <a:ln w="38100">
+          <a:ln w="76200">
             <a:solidFill>
               <a:srgbClr val="CC0000"/>
             </a:solidFill>
@@ -3512,7 +3454,12 @@
             <p:ph type="subTitle" idx="1"/>
           </p:nvPr>
         </p:nvSpPr>
-        <p:spPr/>
+        <p:spPr>
+          <a:xfrm>
+            <a:off x="1524000" y="4544720"/>
+            <a:ext cx="9144000" cy="1655762"/>
+          </a:xfrm>
+        </p:spPr>
         <p:txBody>
           <a:bodyPr>
             <a:normAutofit/>
@@ -3533,7 +3480,15 @@
           <a:p>
             <a:r>
               <a:rPr lang="en-US" dirty="0" smtClean="0"/>
-              <a:t>July 27, 2020</a:t>
+              <a:t>July </a:t>
+            </a:r>
+            <a:r>
+              <a:rPr lang="en-US" dirty="0" smtClean="0"/>
+              <a:t>28, </a:t>
+            </a:r>
+            <a:r>
+              <a:rPr lang="en-US" dirty="0" smtClean="0"/>
+              <a:t>2020</a:t>
             </a:r>
             <a:endParaRPr lang="en-US" dirty="0"/>
           </a:p>
@@ -3623,11 +3578,7 @@
           <a:p>
             <a:r>
               <a:rPr lang="en-US" dirty="0" smtClean="0"/>
-              <a:t>Recommend new </a:t>
-            </a:r>
-            <a:r>
-              <a:rPr lang="en-US" dirty="0" smtClean="0"/>
-              <a:t>stores in these cities:</a:t>
+              <a:t>Recommend new stores in these cities:</a:t>
             </a:r>
           </a:p>
           <a:p>
@@ -3636,7 +3587,6 @@
               <a:rPr lang="en-US" dirty="0" smtClean="0"/>
               <a:t>Seattle, WA</a:t>
             </a:r>
-            <a:endParaRPr lang="en-US" dirty="0" smtClean="0"/>
           </a:p>
           <a:p>
             <a:pPr lvl="1"/>
@@ -3644,7 +3594,6 @@
               <a:rPr lang="en-US" dirty="0" smtClean="0"/>
               <a:t>Denver, CO</a:t>
             </a:r>
-            <a:endParaRPr lang="en-US" dirty="0" smtClean="0"/>
           </a:p>
           <a:p>
             <a:pPr lvl="1"/>
@@ -3659,7 +3608,6 @@
               <a:rPr lang="en-US" dirty="0" smtClean="0"/>
               <a:t>San Juan, PR</a:t>
             </a:r>
-            <a:endParaRPr lang="en-US" dirty="0" smtClean="0"/>
           </a:p>
         </p:txBody>
       </p:sp>
@@ -3717,7 +3665,6 @@
               <a:rPr lang="en-US" dirty="0" smtClean="0"/>
               <a:t>Iowa</a:t>
             </a:r>
-            <a:endParaRPr lang="en-US" dirty="0" smtClean="0"/>
           </a:p>
           <a:p>
             <a:endParaRPr lang="en-US" dirty="0"/>
@@ -3961,7 +3908,7 @@
 </file>
 
 <file path=ppt/slides/slide11.xml><?xml version="1.0" encoding="utf-8"?>
-<p:sld xmlns:a="http://schemas.openxmlformats.org/drawingml/2006/main" xmlns:r="http://schemas.openxmlformats.org/officeDocument/2006/relationships" xmlns:p="http://schemas.openxmlformats.org/presentationml/2006/main" show="0">
+<p:sld xmlns:a="http://schemas.openxmlformats.org/drawingml/2006/main" xmlns:r="http://schemas.openxmlformats.org/officeDocument/2006/relationships" xmlns:p="http://schemas.openxmlformats.org/presentationml/2006/main">
   <p:cSld>
     <p:spTree>
       <p:nvGrpSpPr>
@@ -3979,7 +3926,7 @@
       </p:grpSpPr>
       <p:sp>
         <p:nvSpPr>
-          <p:cNvPr id="2" name="Title 1"/>
+          <p:cNvPr id="6" name="Title 5"/>
           <p:cNvSpPr>
             <a:spLocks noGrp="1"/>
           </p:cNvSpPr>
@@ -3994,7 +3941,7 @@
           <a:p>
             <a:r>
               <a:rPr lang="en-US" dirty="0" smtClean="0"/>
-              <a:t>Competitor Analysis</a:t>
+              <a:t>Thank you</a:t>
             </a:r>
             <a:endParaRPr lang="en-US" dirty="0"/>
           </a:p>
@@ -4002,36 +3949,26 @@
       </p:sp>
       <p:sp>
         <p:nvSpPr>
-          <p:cNvPr id="3" name="Content Placeholder 2"/>
-          <p:cNvSpPr>
-            <a:spLocks noGrp="1"/>
-          </p:cNvSpPr>
-          <p:nvPr>
-            <p:ph idx="1"/>
-          </p:nvPr>
-        </p:nvSpPr>
-        <p:spPr/>
-        <p:txBody>
-          <a:bodyPr/>
-          <a:lstStyle/>
-          <a:p>
-            <a:r>
-              <a:rPr lang="en-US" dirty="0" smtClean="0"/>
-              <a:t>Walgreens facts</a:t>
-            </a:r>
-          </a:p>
-          <a:p>
-            <a:r>
-              <a:rPr lang="en-US" dirty="0" smtClean="0"/>
-              <a:t>Walgreens financials</a:t>
-            </a:r>
-            <a:endParaRPr lang="en-US" dirty="0"/>
-          </a:p>
-        </p:txBody>
-      </p:sp>
-      <p:sp>
-        <p:nvSpPr>
-          <p:cNvPr id="4" name="Slide Number Placeholder 3"/>
+          <p:cNvPr id="7" name="Text Placeholder 6"/>
+          <p:cNvSpPr>
+            <a:spLocks noGrp="1"/>
+          </p:cNvSpPr>
+          <p:nvPr>
+            <p:ph type="body" idx="1"/>
+          </p:nvPr>
+        </p:nvSpPr>
+        <p:spPr/>
+        <p:txBody>
+          <a:bodyPr/>
+          <a:lstStyle/>
+          <a:p>
+            <a:endParaRPr lang="en-US"/>
+          </a:p>
+        </p:txBody>
+      </p:sp>
+      <p:sp>
+        <p:nvSpPr>
+          <p:cNvPr id="5" name="Slide Number Placeholder 4"/>
           <p:cNvSpPr>
             <a:spLocks noGrp="1"/>
           </p:cNvSpPr>
@@ -4055,28 +3992,13 @@
     </p:spTree>
     <p:extLst>
       <p:ext uri="{BB962C8B-B14F-4D97-AF65-F5344CB8AC3E}">
-        <p14:creationId xmlns:p14="http://schemas.microsoft.com/office/powerpoint/2010/main" val="3549639268"/>
+        <p14:creationId xmlns:p14="http://schemas.microsoft.com/office/powerpoint/2010/main" val="1553944600"/>
       </p:ext>
     </p:extLst>
   </p:cSld>
   <p:clrMapOvr>
     <a:masterClrMapping/>
   </p:clrMapOvr>
-  <mc:AlternateContent xmlns:mc="http://schemas.openxmlformats.org/markup-compatibility/2006">
-    <mc:Choice xmlns:p14="http://schemas.microsoft.com/office/powerpoint/2010/main" Requires="p14">
-      <p:transition spd="slow" p14:dur="2000"/>
-    </mc:Choice>
-    <mc:Fallback>
-      <p:transition spd="slow"/>
-    </mc:Fallback>
-  </mc:AlternateContent>
-  <p:timing>
-    <p:tnLst>
-      <p:par>
-        <p:cTn id="1" dur="indefinite" restart="never" nodeType="tmRoot"/>
-      </p:par>
-    </p:tnLst>
-  </p:timing>
 </p:sld>
 </file>
 
@@ -4137,6 +4059,126 @@
           <a:p>
             <a:r>
               <a:rPr lang="en-US" dirty="0" smtClean="0"/>
+              <a:t>Walgreens facts</a:t>
+            </a:r>
+          </a:p>
+          <a:p>
+            <a:r>
+              <a:rPr lang="en-US" dirty="0" smtClean="0"/>
+              <a:t>Walgreens financials</a:t>
+            </a:r>
+            <a:endParaRPr lang="en-US" dirty="0"/>
+          </a:p>
+        </p:txBody>
+      </p:sp>
+      <p:sp>
+        <p:nvSpPr>
+          <p:cNvPr id="4" name="Slide Number Placeholder 3"/>
+          <p:cNvSpPr>
+            <a:spLocks noGrp="1"/>
+          </p:cNvSpPr>
+          <p:nvPr>
+            <p:ph type="sldNum" sz="quarter" idx="12"/>
+          </p:nvPr>
+        </p:nvSpPr>
+        <p:spPr/>
+        <p:txBody>
+          <a:bodyPr/>
+          <a:lstStyle/>
+          <a:p>
+            <a:fld id="{BF6D4B1F-8553-483E-A902-D322D1246890}" type="slidenum">
+              <a:rPr lang="en-US" smtClean="0"/>
+              <a:t>12</a:t>
+            </a:fld>
+            <a:endParaRPr lang="en-US"/>
+          </a:p>
+        </p:txBody>
+      </p:sp>
+    </p:spTree>
+    <p:extLst>
+      <p:ext uri="{BB962C8B-B14F-4D97-AF65-F5344CB8AC3E}">
+        <p14:creationId xmlns:p14="http://schemas.microsoft.com/office/powerpoint/2010/main" val="3549639268"/>
+      </p:ext>
+    </p:extLst>
+  </p:cSld>
+  <p:clrMapOvr>
+    <a:masterClrMapping/>
+  </p:clrMapOvr>
+  <mc:AlternateContent xmlns:mc="http://schemas.openxmlformats.org/markup-compatibility/2006" xmlns:p14="http://schemas.microsoft.com/office/powerpoint/2010/main">
+    <mc:Choice Requires="p14">
+      <p:transition spd="slow" p14:dur="2000"/>
+    </mc:Choice>
+    <mc:Fallback xmlns="">
+      <p:transition spd="slow"/>
+    </mc:Fallback>
+  </mc:AlternateContent>
+  <p:timing>
+    <p:tnLst>
+      <p:par>
+        <p:cTn id="1" dur="indefinite" restart="never" nodeType="tmRoot"/>
+      </p:par>
+    </p:tnLst>
+  </p:timing>
+</p:sld>
+</file>
+
+<file path=ppt/slides/slide13.xml><?xml version="1.0" encoding="utf-8"?>
+<p:sld xmlns:a="http://schemas.openxmlformats.org/drawingml/2006/main" xmlns:r="http://schemas.openxmlformats.org/officeDocument/2006/relationships" xmlns:p="http://schemas.openxmlformats.org/presentationml/2006/main" show="0">
+  <p:cSld>
+    <p:spTree>
+      <p:nvGrpSpPr>
+        <p:cNvPr id="1" name=""/>
+        <p:cNvGrpSpPr/>
+        <p:nvPr/>
+      </p:nvGrpSpPr>
+      <p:grpSpPr>
+        <a:xfrm>
+          <a:off x="0" y="0"/>
+          <a:ext cx="0" cy="0"/>
+          <a:chOff x="0" y="0"/>
+          <a:chExt cx="0" cy="0"/>
+        </a:xfrm>
+      </p:grpSpPr>
+      <p:sp>
+        <p:nvSpPr>
+          <p:cNvPr id="2" name="Title 1"/>
+          <p:cNvSpPr>
+            <a:spLocks noGrp="1"/>
+          </p:cNvSpPr>
+          <p:nvPr>
+            <p:ph type="title"/>
+          </p:nvPr>
+        </p:nvSpPr>
+        <p:spPr/>
+        <p:txBody>
+          <a:bodyPr/>
+          <a:lstStyle/>
+          <a:p>
+            <a:r>
+              <a:rPr lang="en-US" dirty="0" smtClean="0"/>
+              <a:t>Competitor Analysis</a:t>
+            </a:r>
+            <a:endParaRPr lang="en-US" dirty="0"/>
+          </a:p>
+        </p:txBody>
+      </p:sp>
+      <p:sp>
+        <p:nvSpPr>
+          <p:cNvPr id="3" name="Content Placeholder 2"/>
+          <p:cNvSpPr>
+            <a:spLocks noGrp="1"/>
+          </p:cNvSpPr>
+          <p:nvPr>
+            <p:ph idx="1"/>
+          </p:nvPr>
+        </p:nvSpPr>
+        <p:spPr/>
+        <p:txBody>
+          <a:bodyPr/>
+          <a:lstStyle/>
+          <a:p>
+            <a:r>
+              <a:rPr lang="en-US" dirty="0" smtClean="0"/>
               <a:t>Highlight cities where </a:t>
             </a:r>
             <a:r>
@@ -4168,7 +4210,7 @@
           <a:p>
             <a:fld id="{BF6D4B1F-8553-483E-A902-D322D1246890}" type="slidenum">
               <a:rPr lang="en-US" smtClean="0"/>
-              <a:t>12</a:t>
+              <a:t>13</a:t>
             </a:fld>
             <a:endParaRPr lang="en-US"/>
           </a:p>
@@ -4184,11 +4226,11 @@
   <p:clrMapOvr>
     <a:masterClrMapping/>
   </p:clrMapOvr>
-  <mc:AlternateContent xmlns:mc="http://schemas.openxmlformats.org/markup-compatibility/2006">
-    <mc:Choice xmlns:p14="http://schemas.microsoft.com/office/powerpoint/2010/main" Requires="p14">
+  <mc:AlternateContent xmlns:mc="http://schemas.openxmlformats.org/markup-compatibility/2006" xmlns:p14="http://schemas.microsoft.com/office/powerpoint/2010/main">
+    <mc:Choice Requires="p14">
       <p:transition spd="slow" p14:dur="2000"/>
     </mc:Choice>
-    <mc:Fallback>
+    <mc:Fallback xmlns="">
       <p:transition spd="slow"/>
     </mc:Fallback>
   </mc:AlternateContent>
@@ -4261,39 +4303,121 @@
           <a:p>
             <a:r>
               <a:rPr lang="en-US" dirty="0" smtClean="0"/>
-              <a:t>~10,000 stores in the United States</a:t>
-            </a:r>
-          </a:p>
-          <a:p>
-            <a:r>
-              <a:rPr lang="en-US" dirty="0" smtClean="0"/>
-              <a:t>$256B in revenue in 2019</a:t>
-            </a:r>
-          </a:p>
-          <a:p>
-            <a:r>
-              <a:rPr lang="en-US" dirty="0" smtClean="0"/>
-              <a:t>Top sources of income are pharmacy sales ($141B) </a:t>
-            </a:r>
-            <a:br>
-              <a:rPr lang="en-US" dirty="0" smtClean="0"/>
-            </a:br>
-            <a:r>
-              <a:rPr lang="en-US" dirty="0" smtClean="0"/>
-              <a:t>and in-store sales ($86B)*</a:t>
-            </a:r>
-            <a:endParaRPr lang="en-US" baseline="30000" dirty="0" smtClean="0"/>
-          </a:p>
-          <a:p>
-            <a:r>
-              <a:rPr lang="en-US" dirty="0" smtClean="0"/>
-              <a:t>Majority of pharmacy sales are within the pharmacy network (in-store)</a:t>
-            </a:r>
-          </a:p>
-          <a:p>
-            <a:r>
-              <a:rPr lang="en-US" dirty="0" smtClean="0"/>
-              <a:t>Increasing brick-and-mortar presence is still a viable way to grow revenue.</a:t>
+              <a:t>~10,000 stores in the United </a:t>
+            </a:r>
+            <a:r>
+              <a:rPr lang="en-US" dirty="0" smtClean="0"/>
+              <a:t>States</a:t>
+            </a:r>
+            <a:r>
+              <a:rPr lang="en-US" dirty="0" smtClean="0"/>
+              <a:t>, </a:t>
+            </a:r>
+            <a:r>
+              <a:rPr lang="en-US" dirty="0" smtClean="0"/>
+              <a:t>$256B </a:t>
+            </a:r>
+            <a:r>
+              <a:rPr lang="en-US" dirty="0" smtClean="0"/>
+              <a:t>in revenue in </a:t>
+            </a:r>
+            <a:r>
+              <a:rPr lang="en-US" dirty="0" smtClean="0"/>
+              <a:t>2019</a:t>
+            </a:r>
+          </a:p>
+          <a:p>
+            <a:endParaRPr lang="en-US" dirty="0" smtClean="0"/>
+          </a:p>
+          <a:p>
+            <a:r>
+              <a:rPr lang="en-US" dirty="0" smtClean="0"/>
+              <a:t>Top sources of </a:t>
+            </a:r>
+            <a:r>
+              <a:rPr lang="en-US" dirty="0" smtClean="0"/>
+              <a:t>income:</a:t>
+            </a:r>
+          </a:p>
+          <a:p>
+            <a:pPr marL="971550" lvl="1" indent="-514350">
+              <a:buFont typeface="+mj-lt"/>
+              <a:buAutoNum type="arabicPeriod"/>
+            </a:pPr>
+            <a:r>
+              <a:rPr lang="en-US" dirty="0" smtClean="0"/>
+              <a:t>Pharmacy </a:t>
+            </a:r>
+            <a:r>
+              <a:rPr lang="en-US" dirty="0" smtClean="0"/>
+              <a:t>sales ($141B) </a:t>
+            </a:r>
+            <a:r>
+              <a:rPr lang="en-US" baseline="30000" dirty="0" smtClean="0"/>
+              <a:t>*</a:t>
+            </a:r>
+            <a:endParaRPr lang="en-US" dirty="0"/>
+          </a:p>
+          <a:p>
+            <a:pPr marL="971550" lvl="1" indent="-514350">
+              <a:buFont typeface="+mj-lt"/>
+              <a:buAutoNum type="arabicPeriod"/>
+            </a:pPr>
+            <a:r>
+              <a:rPr lang="en-US" dirty="0" smtClean="0"/>
+              <a:t>In-store </a:t>
+            </a:r>
+            <a:r>
+              <a:rPr lang="en-US" dirty="0" smtClean="0"/>
+              <a:t>sales ($86B)</a:t>
+            </a:r>
+            <a:r>
+              <a:rPr lang="en-US" baseline="30000" dirty="0" smtClean="0"/>
+              <a:t>*</a:t>
+            </a:r>
+          </a:p>
+          <a:p>
+            <a:r>
+              <a:rPr lang="en-US" dirty="0" smtClean="0"/>
+              <a:t>Majority of pharmacy sales are within </a:t>
+            </a:r>
+            <a:r>
+              <a:rPr lang="en-US" dirty="0" smtClean="0"/>
+              <a:t>network </a:t>
+            </a:r>
+            <a:r>
+              <a:rPr lang="en-US" dirty="0" smtClean="0"/>
+              <a:t>(in-store</a:t>
+            </a:r>
+            <a:r>
+              <a:rPr lang="en-US" dirty="0" smtClean="0"/>
+              <a:t>)</a:t>
+            </a:r>
+            <a:r>
+              <a:rPr lang="en-US" baseline="30000" dirty="0" smtClean="0"/>
+              <a:t>*</a:t>
+            </a:r>
+            <a:endParaRPr lang="en-US" dirty="0" smtClean="0"/>
+          </a:p>
+          <a:p>
+            <a:endParaRPr lang="en-US" dirty="0" smtClean="0"/>
+          </a:p>
+          <a:p>
+            <a:pPr>
+              <a:buFont typeface="Wingdings" panose="05000000000000000000" pitchFamily="2" charset="2"/>
+              <a:buChar char="Ø"/>
+            </a:pPr>
+            <a:r>
+              <a:rPr lang="en-US" dirty="0" smtClean="0"/>
+              <a:t>Opening new stores </a:t>
+            </a:r>
+            <a:r>
+              <a:rPr lang="en-US" dirty="0" smtClean="0"/>
+              <a:t>is </a:t>
+            </a:r>
+            <a:r>
+              <a:rPr lang="en-US" dirty="0" smtClean="0"/>
+              <a:t>still a viable way to grow revenue.</a:t>
             </a:r>
             <a:endParaRPr lang="en-US" dirty="0"/>
           </a:p>
@@ -4443,7 +4567,11 @@
             <a:pPr lvl="1"/>
             <a:r>
               <a:rPr lang="en-US" dirty="0" smtClean="0"/>
-              <a:t>Brick-and-mortar stores are a great way to increase revenue, but CVS is running out of new places to open stores.</a:t>
+              <a:t>Opening new stores is a </a:t>
+            </a:r>
+            <a:r>
+              <a:rPr lang="en-US" dirty="0" smtClean="0"/>
+              <a:t>great way to increase revenue, but CVS is running out of new places to open stores.</a:t>
             </a:r>
           </a:p>
           <a:p>
@@ -4454,21 +4582,16 @@
               <a:rPr lang="en-US" b="1" dirty="0" smtClean="0"/>
               <a:t>Value Proposition:</a:t>
             </a:r>
-            <a:endParaRPr lang="en-US" b="1" dirty="0" smtClean="0"/>
           </a:p>
           <a:p>
             <a:pPr lvl="1"/>
             <a:r>
               <a:rPr lang="en-US" dirty="0" smtClean="0"/>
-              <a:t>CVS can identify new store locations by comparing current locations with </a:t>
-            </a:r>
-            <a:r>
-              <a:rPr lang="en-US" dirty="0" smtClean="0"/>
-              <a:t>regional </a:t>
-            </a:r>
-            <a:r>
-              <a:rPr lang="en-US" dirty="0" smtClean="0"/>
-              <a:t>population data.</a:t>
+              <a:t>CVS can identify new store locations </a:t>
+            </a:r>
+            <a:r>
+              <a:rPr lang="en-US" dirty="0" smtClean="0"/>
+              <a:t>by targeting areas with higher demand based on population.</a:t>
             </a:r>
             <a:endParaRPr lang="en-US" dirty="0" smtClean="0"/>
           </a:p>
@@ -4731,7 +4854,7 @@
           <a:p>
             <a:r>
               <a:rPr lang="en-US" dirty="0" smtClean="0"/>
-              <a:t>Data Analysis</a:t>
+              <a:t>What is the average number of CVS Stores per capita?</a:t>
             </a:r>
             <a:endParaRPr lang="en-US" dirty="0"/>
           </a:p>
@@ -4744,48 +4867,94 @@
             <a:spLocks noGrp="1"/>
           </p:cNvSpPr>
           <p:nvPr>
-            <p:ph idx="1"/>
-          </p:nvPr>
-        </p:nvSpPr>
-        <p:spPr>
-          <a:xfrm>
-            <a:off x="838200" y="1825625"/>
-            <a:ext cx="5163207" cy="4351338"/>
-          </a:xfrm>
-        </p:spPr>
-        <p:txBody>
-          <a:bodyPr/>
-          <a:lstStyle/>
-          <a:p>
-            <a:r>
-              <a:rPr lang="en-US" dirty="0" smtClean="0"/>
-              <a:t>States were grouped based on number of stores  per person</a:t>
+            <p:ph type="body" sz="half" idx="2"/>
+          </p:nvPr>
+        </p:nvSpPr>
+        <p:spPr/>
+        <p:txBody>
+          <a:bodyPr/>
+          <a:lstStyle/>
+          <a:p>
+            <a:r>
+              <a:rPr lang="en-US" dirty="0" smtClean="0"/>
+              <a:t>On average:</a:t>
+            </a:r>
+          </a:p>
+          <a:p>
+            <a:r>
+              <a:rPr lang="en-US" dirty="0" smtClean="0"/>
+              <a:t>	1 CVS /</a:t>
+            </a:r>
+            <a:r>
+              <a:rPr lang="en-US" dirty="0" smtClean="0"/>
+              <a:t> 33,000 people</a:t>
+            </a:r>
+          </a:p>
+          <a:p>
+            <a:endParaRPr lang="en-US" dirty="0"/>
+          </a:p>
+          <a:p>
+            <a:r>
+              <a:rPr lang="en-US" b="1" dirty="0">
+                <a:solidFill>
+                  <a:srgbClr val="008000"/>
+                </a:solidFill>
+              </a:rPr>
+              <a:t>Green</a:t>
+            </a:r>
+            <a:r>
+              <a:rPr lang="en-US" dirty="0"/>
+              <a:t> – higher than average number of stores per person</a:t>
+            </a:r>
+          </a:p>
+          <a:p>
+            <a:r>
+              <a:rPr lang="en-US" b="1" dirty="0">
+                <a:solidFill>
+                  <a:srgbClr val="FF0000"/>
+                </a:solidFill>
+              </a:rPr>
+              <a:t>Red</a:t>
+            </a:r>
+            <a:r>
+              <a:rPr lang="en-US" dirty="0">
+                <a:solidFill>
+                  <a:srgbClr val="FF0000"/>
+                </a:solidFill>
+              </a:rPr>
+              <a:t> </a:t>
+            </a:r>
+            <a:r>
+              <a:rPr lang="en-US" dirty="0"/>
+              <a:t>– lower than average</a:t>
             </a:r>
           </a:p>
           <a:p>
             <a:endParaRPr lang="en-US" dirty="0" smtClean="0"/>
           </a:p>
-          <a:p>
-            <a:r>
-              <a:rPr lang="en-US" dirty="0" smtClean="0"/>
-              <a:t>On average,</a:t>
-            </a:r>
-            <a:br>
-              <a:rPr lang="en-US" dirty="0" smtClean="0"/>
-            </a:br>
-            <a:r>
-              <a:rPr lang="en-US" dirty="0" smtClean="0"/>
-              <a:t>   one store per 33,000 people</a:t>
-            </a:r>
-          </a:p>
-          <a:p>
-            <a:endParaRPr lang="en-US" dirty="0"/>
-          </a:p>
-          <a:p>
-            <a:r>
-              <a:rPr lang="en-US" dirty="0" smtClean="0"/>
-              <a:t>Some states are way below the average</a:t>
-            </a:r>
+        </p:txBody>
+      </p:sp>
+      <p:sp>
+        <p:nvSpPr>
+          <p:cNvPr id="9" name="Slide Number Placeholder 8"/>
+          <p:cNvSpPr>
+            <a:spLocks noGrp="1"/>
+          </p:cNvSpPr>
+          <p:nvPr>
+            <p:ph type="sldNum" sz="quarter" idx="12"/>
+          </p:nvPr>
+        </p:nvSpPr>
+        <p:spPr/>
+        <p:txBody>
+          <a:bodyPr/>
+          <a:lstStyle/>
+          <a:p>
+            <a:fld id="{BF6D4B1F-8553-483E-A902-D322D1246890}" type="slidenum">
+              <a:rPr lang="en-US" smtClean="0"/>
+              <a:pPr/>
+              <a:t>5</a:t>
+            </a:fld>
+            <a:endParaRPr lang="en-US"/>
           </a:p>
         </p:txBody>
       </p:sp>
@@ -4811,37 +4980,14 @@
         </p:blipFill>
         <p:spPr>
           <a:xfrm>
-            <a:off x="6531029" y="1220186"/>
-            <a:ext cx="5209025" cy="5209025"/>
+            <a:off x="5816339" y="791443"/>
+            <a:ext cx="5453388" cy="5453388"/>
           </a:xfrm>
           <a:prstGeom prst="rect">
             <a:avLst/>
           </a:prstGeom>
         </p:spPr>
       </p:pic>
-      <p:sp>
-        <p:nvSpPr>
-          <p:cNvPr id="9" name="Slide Number Placeholder 8"/>
-          <p:cNvSpPr>
-            <a:spLocks noGrp="1"/>
-          </p:cNvSpPr>
-          <p:nvPr>
-            <p:ph type="sldNum" sz="quarter" idx="12"/>
-          </p:nvPr>
-        </p:nvSpPr>
-        <p:spPr/>
-        <p:txBody>
-          <a:bodyPr/>
-          <a:lstStyle/>
-          <a:p>
-            <a:fld id="{BF6D4B1F-8553-483E-A902-D322D1246890}" type="slidenum">
-              <a:rPr lang="en-US" smtClean="0"/>
-              <a:t>5</a:t>
-            </a:fld>
-            <a:endParaRPr lang="en-US"/>
-          </a:p>
-        </p:txBody>
-      </p:sp>
     </p:spTree>
     <p:extLst>
       <p:ext uri="{BB962C8B-B14F-4D97-AF65-F5344CB8AC3E}">
@@ -4896,7 +5042,7 @@
           <a:p>
             <a:r>
               <a:rPr lang="en-US" dirty="0" smtClean="0"/>
-              <a:t>Data Analysis</a:t>
+              <a:t>What are the top 10 states above and below average?</a:t>
             </a:r>
             <a:endParaRPr lang="en-US" dirty="0"/>
           </a:p>
@@ -4909,38 +5055,72 @@
             <a:spLocks noGrp="1"/>
           </p:cNvSpPr>
           <p:nvPr>
-            <p:ph idx="1"/>
-          </p:nvPr>
-        </p:nvSpPr>
-        <p:spPr>
-          <a:xfrm>
-            <a:off x="838200" y="1825625"/>
-            <a:ext cx="5068614" cy="4351338"/>
-          </a:xfrm>
-        </p:spPr>
-        <p:txBody>
-          <a:bodyPr/>
-          <a:lstStyle/>
-          <a:p>
-            <a:r>
-              <a:rPr lang="en-US" dirty="0" smtClean="0"/>
-              <a:t>Stores were grouped by:</a:t>
-            </a:r>
-          </a:p>
-          <a:p>
-            <a:pPr lvl="1"/>
-            <a:r>
-              <a:rPr lang="en-US" dirty="0" smtClean="0"/>
-              <a:t>Higher than average number of stores per person (green)</a:t>
-            </a:r>
-          </a:p>
-          <a:p>
-            <a:pPr lvl="1"/>
-            <a:r>
-              <a:rPr lang="en-US" dirty="0" smtClean="0"/>
-              <a:t>Lower than average (red)</a:t>
-            </a:r>
-            <a:endParaRPr lang="en-US" dirty="0"/>
+            <p:ph type="body" sz="half" idx="2"/>
+          </p:nvPr>
+        </p:nvSpPr>
+        <p:spPr/>
+        <p:txBody>
+          <a:bodyPr/>
+          <a:lstStyle/>
+          <a:p>
+            <a:r>
+              <a:rPr lang="en-US" b="1" dirty="0" smtClean="0">
+                <a:solidFill>
+                  <a:srgbClr val="008000"/>
+                </a:solidFill>
+              </a:rPr>
+              <a:t>Green</a:t>
+            </a:r>
+            <a:r>
+              <a:rPr lang="en-US" dirty="0" smtClean="0"/>
+              <a:t> – higher than average number of stores per person</a:t>
+            </a:r>
+          </a:p>
+          <a:p>
+            <a:r>
+              <a:rPr lang="en-US" b="1" dirty="0" smtClean="0">
+                <a:solidFill>
+                  <a:srgbClr val="FF0000"/>
+                </a:solidFill>
+              </a:rPr>
+              <a:t>Red</a:t>
+            </a:r>
+            <a:r>
+              <a:rPr lang="en-US" dirty="0" smtClean="0">
+                <a:solidFill>
+                  <a:srgbClr val="FF0000"/>
+                </a:solidFill>
+              </a:rPr>
+              <a:t> </a:t>
+            </a:r>
+            <a:r>
+              <a:rPr lang="en-US" dirty="0" smtClean="0"/>
+              <a:t>– lower than average</a:t>
+            </a:r>
+            <a:endParaRPr lang="en-US" dirty="0" smtClean="0"/>
+          </a:p>
+        </p:txBody>
+      </p:sp>
+      <p:sp>
+        <p:nvSpPr>
+          <p:cNvPr id="6" name="Slide Number Placeholder 5"/>
+          <p:cNvSpPr>
+            <a:spLocks noGrp="1"/>
+          </p:cNvSpPr>
+          <p:nvPr>
+            <p:ph type="sldNum" sz="quarter" idx="12"/>
+          </p:nvPr>
+        </p:nvSpPr>
+        <p:spPr/>
+        <p:txBody>
+          <a:bodyPr/>
+          <a:lstStyle/>
+          <a:p>
+            <a:fld id="{BF6D4B1F-8553-483E-A902-D322D1246890}" type="slidenum">
+              <a:rPr lang="en-US" smtClean="0"/>
+              <a:t>6</a:t>
+            </a:fld>
+            <a:endParaRPr lang="en-US"/>
           </a:p>
         </p:txBody>
       </p:sp>
@@ -4959,37 +5139,14 @@
         </p:blipFill>
         <p:spPr>
           <a:xfrm>
-            <a:off x="6173678" y="1746942"/>
-            <a:ext cx="5272088" cy="4508704"/>
+            <a:off x="5269584" y="973758"/>
+            <a:ext cx="6176182" cy="5281888"/>
           </a:xfrm>
           <a:prstGeom prst="rect">
             <a:avLst/>
           </a:prstGeom>
         </p:spPr>
       </p:pic>
-      <p:sp>
-        <p:nvSpPr>
-          <p:cNvPr id="6" name="Slide Number Placeholder 5"/>
-          <p:cNvSpPr>
-            <a:spLocks noGrp="1"/>
-          </p:cNvSpPr>
-          <p:nvPr>
-            <p:ph type="sldNum" sz="quarter" idx="12"/>
-          </p:nvPr>
-        </p:nvSpPr>
-        <p:spPr/>
-        <p:txBody>
-          <a:bodyPr/>
-          <a:lstStyle/>
-          <a:p>
-            <a:fld id="{BF6D4B1F-8553-483E-A902-D322D1246890}" type="slidenum">
-              <a:rPr lang="en-US" smtClean="0"/>
-              <a:t>6</a:t>
-            </a:fld>
-            <a:endParaRPr lang="en-US"/>
-          </a:p>
-        </p:txBody>
-      </p:sp>
     </p:spTree>
     <p:extLst>
       <p:ext uri="{BB962C8B-B14F-4D97-AF65-F5344CB8AC3E}">
@@ -5037,37 +5194,10 @@
             <p:ph type="title"/>
           </p:nvPr>
         </p:nvSpPr>
-        <p:spPr/>
-        <p:txBody>
-          <a:bodyPr/>
-          <a:lstStyle/>
-          <a:p>
-            <a:r>
-              <a:rPr lang="en-US" dirty="0" smtClean="0"/>
-              <a:t>Dat</a:t>
-            </a:r>
-            <a:r>
-              <a:rPr lang="en-US" dirty="0" smtClean="0"/>
-              <a:t>a Analysis</a:t>
-            </a:r>
-            <a:endParaRPr lang="en-US" dirty="0"/>
-          </a:p>
-        </p:txBody>
-      </p:sp>
-      <p:sp>
-        <p:nvSpPr>
-          <p:cNvPr id="3" name="Content Placeholder 2"/>
-          <p:cNvSpPr>
-            <a:spLocks noGrp="1"/>
-          </p:cNvSpPr>
-          <p:nvPr>
-            <p:ph idx="1"/>
-          </p:nvPr>
-        </p:nvSpPr>
         <p:spPr>
           <a:xfrm>
-            <a:off x="838200" y="1825625"/>
-            <a:ext cx="5236779" cy="4351338"/>
+            <a:off x="839788" y="457200"/>
+            <a:ext cx="3932237" cy="626882"/>
           </a:xfrm>
         </p:spPr>
         <p:txBody>
@@ -5076,9 +5206,91 @@
           <a:p>
             <a:r>
               <a:rPr lang="en-US" dirty="0" smtClean="0"/>
-              <a:t>Cities were group and analyzed the same way</a:t>
+              <a:t>What about by city?</a:t>
             </a:r>
             <a:endParaRPr lang="en-US" dirty="0"/>
+          </a:p>
+        </p:txBody>
+      </p:sp>
+      <p:sp>
+        <p:nvSpPr>
+          <p:cNvPr id="3" name="Content Placeholder 2"/>
+          <p:cNvSpPr>
+            <a:spLocks noGrp="1"/>
+          </p:cNvSpPr>
+          <p:nvPr>
+            <p:ph type="body" sz="half" idx="2"/>
+          </p:nvPr>
+        </p:nvSpPr>
+        <p:spPr>
+          <a:xfrm>
+            <a:off x="839788" y="1395168"/>
+            <a:ext cx="3932237" cy="4473820"/>
+          </a:xfrm>
+        </p:spPr>
+        <p:txBody>
+          <a:bodyPr>
+            <a:normAutofit/>
+          </a:bodyPr>
+          <a:lstStyle/>
+          <a:p>
+            <a:r>
+              <a:rPr lang="en-US" sz="1600" b="1" dirty="0">
+                <a:solidFill>
+                  <a:srgbClr val="008000"/>
+                </a:solidFill>
+              </a:rPr>
+              <a:t>Green</a:t>
+            </a:r>
+            <a:r>
+              <a:rPr lang="en-US" sz="1600" dirty="0"/>
+              <a:t> – higher than average number of stores per person</a:t>
+            </a:r>
+          </a:p>
+          <a:p>
+            <a:r>
+              <a:rPr lang="en-US" sz="1600" b="1" dirty="0">
+                <a:solidFill>
+                  <a:srgbClr val="FF0000"/>
+                </a:solidFill>
+              </a:rPr>
+              <a:t>Red</a:t>
+            </a:r>
+            <a:r>
+              <a:rPr lang="en-US" sz="1600" dirty="0">
+                <a:solidFill>
+                  <a:srgbClr val="FF0000"/>
+                </a:solidFill>
+              </a:rPr>
+              <a:t> </a:t>
+            </a:r>
+            <a:r>
+              <a:rPr lang="en-US" sz="1600" dirty="0"/>
+              <a:t>– lower than average</a:t>
+            </a:r>
+          </a:p>
+        </p:txBody>
+      </p:sp>
+      <p:sp>
+        <p:nvSpPr>
+          <p:cNvPr id="6" name="Slide Number Placeholder 5"/>
+          <p:cNvSpPr>
+            <a:spLocks noGrp="1"/>
+          </p:cNvSpPr>
+          <p:nvPr>
+            <p:ph type="sldNum" sz="quarter" idx="12"/>
+          </p:nvPr>
+        </p:nvSpPr>
+        <p:spPr/>
+        <p:txBody>
+          <a:bodyPr/>
+          <a:lstStyle/>
+          <a:p>
+            <a:fld id="{BF6D4B1F-8553-483E-A902-D322D1246890}" type="slidenum">
+              <a:rPr lang="en-US" smtClean="0"/>
+              <a:t>7</a:t>
+            </a:fld>
+            <a:endParaRPr lang="en-US"/>
           </a:p>
         </p:txBody>
       </p:sp>
@@ -5098,8 +5310,8 @@
         </p:blipFill>
         <p:spPr>
           <a:xfrm>
-            <a:off x="1522438" y="2942660"/>
-            <a:ext cx="3868301" cy="3626087"/>
+            <a:off x="1189606" y="2510574"/>
+            <a:ext cx="4013989" cy="3762653"/>
           </a:xfrm>
           <a:prstGeom prst="rect">
             <a:avLst/>
@@ -5122,37 +5334,14 @@
         </p:blipFill>
         <p:spPr>
           <a:xfrm>
-            <a:off x="6306517" y="1562264"/>
-            <a:ext cx="5389403" cy="4878059"/>
+            <a:off x="5840306" y="1150070"/>
+            <a:ext cx="5660193" cy="5123157"/>
           </a:xfrm>
           <a:prstGeom prst="rect">
             <a:avLst/>
           </a:prstGeom>
         </p:spPr>
       </p:pic>
-      <p:sp>
-        <p:nvSpPr>
-          <p:cNvPr id="6" name="Slide Number Placeholder 5"/>
-          <p:cNvSpPr>
-            <a:spLocks noGrp="1"/>
-          </p:cNvSpPr>
-          <p:nvPr>
-            <p:ph type="sldNum" sz="quarter" idx="12"/>
-          </p:nvPr>
-        </p:nvSpPr>
-        <p:spPr/>
-        <p:txBody>
-          <a:bodyPr/>
-          <a:lstStyle/>
-          <a:p>
-            <a:fld id="{BF6D4B1F-8553-483E-A902-D322D1246890}" type="slidenum">
-              <a:rPr lang="en-US" smtClean="0"/>
-              <a:t>7</a:t>
-            </a:fld>
-            <a:endParaRPr lang="en-US"/>
-          </a:p>
-        </p:txBody>
-      </p:sp>
     </p:spTree>
     <p:extLst>
       <p:ext uri="{BB962C8B-B14F-4D97-AF65-F5344CB8AC3E}">
@@ -5207,7 +5396,7 @@
           <a:p>
             <a:r>
               <a:rPr lang="en-US" dirty="0" smtClean="0"/>
-              <a:t>Data Analysis</a:t>
+              <a:t>How do below average cites compare with below average states?</a:t>
             </a:r>
             <a:endParaRPr lang="en-US" dirty="0"/>
           </a:p>
@@ -5220,45 +5409,110 @@
             <a:spLocks noGrp="1"/>
           </p:cNvSpPr>
           <p:nvPr>
-            <p:ph idx="1"/>
+            <p:ph type="body" sz="half" idx="2"/>
           </p:nvPr>
         </p:nvSpPr>
         <p:spPr>
           <a:xfrm>
-            <a:off x="838200" y="1825625"/>
-            <a:ext cx="4385442" cy="4351338"/>
+            <a:off x="839788" y="3018408"/>
+            <a:ext cx="3694505" cy="2850579"/>
           </a:xfrm>
         </p:spPr>
         <p:txBody>
           <a:bodyPr/>
           <a:lstStyle/>
           <a:p>
-            <a:r>
-              <a:rPr lang="en-US" dirty="0" smtClean="0"/>
-              <a:t>Assumption: lower than average number of stores equates to higher demand</a:t>
-            </a:r>
+            <a:endParaRPr lang="en-US" i="1" dirty="0"/>
+          </a:p>
+          <a:p>
+            <a:r>
+              <a:rPr lang="en-US" b="1" dirty="0">
+                <a:solidFill>
+                  <a:srgbClr val="FF6347"/>
+                </a:solidFill>
+              </a:rPr>
+              <a:t>Light Red </a:t>
+            </a:r>
+            <a:r>
+              <a:rPr lang="en-US" dirty="0"/>
+              <a:t>– states below average with </a:t>
+            </a:r>
+            <a:r>
+              <a:rPr lang="en-US" b="1" i="1" dirty="0"/>
+              <a:t>high</a:t>
+            </a:r>
+            <a:r>
+              <a:rPr lang="en-US" dirty="0"/>
+              <a:t> demand in cities</a:t>
+            </a:r>
+          </a:p>
+          <a:p>
+            <a:r>
+              <a:rPr lang="en-US" b="1" dirty="0" smtClean="0">
+                <a:solidFill>
+                  <a:srgbClr val="B22222"/>
+                </a:solidFill>
+              </a:rPr>
+              <a:t>Dark Red</a:t>
+            </a:r>
+            <a:r>
+              <a:rPr lang="en-US" dirty="0" smtClean="0">
+                <a:solidFill>
+                  <a:srgbClr val="B22222"/>
+                </a:solidFill>
+              </a:rPr>
+              <a:t> </a:t>
+            </a:r>
+            <a:r>
+              <a:rPr lang="en-US" dirty="0" smtClean="0"/>
+              <a:t>– states below average with </a:t>
+            </a:r>
+            <a:r>
+              <a:rPr lang="en-US" b="1" i="1" dirty="0" smtClean="0"/>
+              <a:t>low</a:t>
+            </a:r>
+            <a:r>
+              <a:rPr lang="en-US" dirty="0" smtClean="0"/>
+              <a:t> demand in cities</a:t>
+            </a:r>
+          </a:p>
+          <a:p>
+            <a:endParaRPr lang="en-US" i="1" dirty="0" smtClean="0"/>
           </a:p>
           <a:p>
             <a:endParaRPr lang="en-US" dirty="0" smtClean="0"/>
           </a:p>
           <a:p>
-            <a:r>
-              <a:rPr lang="en-US" dirty="0" smtClean="0"/>
-              <a:t>States were grouped a second time based demand for CVS in cities </a:t>
-            </a:r>
-            <a:br>
-              <a:rPr lang="en-US" dirty="0" smtClean="0"/>
-            </a:br>
-            <a:r>
-              <a:rPr lang="en-US" dirty="0" smtClean="0"/>
-              <a:t>vs the state</a:t>
-            </a:r>
+            <a:endParaRPr lang="en-US" dirty="0" smtClean="0"/>
+          </a:p>
+        </p:txBody>
+      </p:sp>
+      <p:sp>
+        <p:nvSpPr>
+          <p:cNvPr id="7" name="Slide Number Placeholder 6"/>
+          <p:cNvSpPr>
+            <a:spLocks noGrp="1"/>
+          </p:cNvSpPr>
+          <p:nvPr>
+            <p:ph type="sldNum" sz="quarter" idx="12"/>
+          </p:nvPr>
+        </p:nvSpPr>
+        <p:spPr/>
+        <p:txBody>
+          <a:bodyPr/>
+          <a:lstStyle/>
+          <a:p>
+            <a:fld id="{BF6D4B1F-8553-483E-A902-D322D1246890}" type="slidenum">
+              <a:rPr lang="en-US" smtClean="0"/>
+              <a:t>8</a:t>
+            </a:fld>
+            <a:endParaRPr lang="en-US"/>
           </a:p>
         </p:txBody>
       </p:sp>
       <p:pic>
         <p:nvPicPr>
-          <p:cNvPr id="5" name="Picture 4"/>
+          <p:cNvPr id="10" name="Picture 9"/>
           <p:cNvPicPr>
             <a:picLocks noChangeAspect="1"/>
           </p:cNvPicPr>
@@ -5272,37 +5526,14 @@
         </p:blipFill>
         <p:spPr>
           <a:xfrm>
-            <a:off x="5888420" y="1825625"/>
-            <a:ext cx="5465380" cy="4136214"/>
+            <a:off x="5455468" y="939816"/>
+            <a:ext cx="5898332" cy="4929171"/>
           </a:xfrm>
           <a:prstGeom prst="rect">
             <a:avLst/>
           </a:prstGeom>
         </p:spPr>
       </p:pic>
-      <p:sp>
-        <p:nvSpPr>
-          <p:cNvPr id="7" name="Slide Number Placeholder 6"/>
-          <p:cNvSpPr>
-            <a:spLocks noGrp="1"/>
-          </p:cNvSpPr>
-          <p:nvPr>
-            <p:ph type="sldNum" sz="quarter" idx="12"/>
-          </p:nvPr>
-        </p:nvSpPr>
-        <p:spPr/>
-        <p:txBody>
-          <a:bodyPr/>
-          <a:lstStyle/>
-          <a:p>
-            <a:fld id="{BF6D4B1F-8553-483E-A902-D322D1246890}" type="slidenum">
-              <a:rPr lang="en-US" smtClean="0"/>
-              <a:t>8</a:t>
-            </a:fld>
-            <a:endParaRPr lang="en-US"/>
-          </a:p>
-        </p:txBody>
-      </p:sp>
     </p:spTree>
     <p:extLst>
       <p:ext uri="{BB962C8B-B14F-4D97-AF65-F5344CB8AC3E}">
@@ -5350,46 +5581,433 @@
             <p:ph type="title"/>
           </p:nvPr>
         </p:nvSpPr>
-        <p:spPr/>
-        <p:txBody>
-          <a:bodyPr/>
-          <a:lstStyle/>
-          <a:p>
-            <a:r>
-              <a:rPr lang="en-US" dirty="0" smtClean="0"/>
-              <a:t>Results</a:t>
-            </a:r>
-            <a:endParaRPr lang="en-US" dirty="0"/>
-          </a:p>
-        </p:txBody>
-      </p:sp>
-      <p:pic>
-        <p:nvPicPr>
-          <p:cNvPr id="5" name="Picture 4"/>
-          <p:cNvPicPr>
-            <a:picLocks noChangeAspect="1"/>
-          </p:cNvPicPr>
-          <p:nvPr/>
-        </p:nvPicPr>
-        <p:blipFill>
-          <a:blip r:embed="rId2"/>
-          <a:stretch>
-            <a:fillRect/>
-          </a:stretch>
-        </p:blipFill>
         <p:spPr>
           <a:xfrm>
-            <a:off x="993227" y="1690688"/>
-            <a:ext cx="5302470" cy="4363491"/>
+            <a:off x="839788" y="457200"/>
+            <a:ext cx="3932237" cy="674016"/>
+          </a:xfrm>
+        </p:spPr>
+        <p:txBody>
+          <a:bodyPr/>
+          <a:lstStyle/>
+          <a:p>
+            <a:r>
+              <a:rPr lang="en-US" dirty="0" smtClean="0"/>
+              <a:t>Conclusion</a:t>
+            </a:r>
+            <a:endParaRPr lang="en-US" dirty="0"/>
+          </a:p>
+        </p:txBody>
+      </p:sp>
+      <p:sp>
+        <p:nvSpPr>
+          <p:cNvPr id="4" name="Text Placeholder 3"/>
+          <p:cNvSpPr>
+            <a:spLocks noGrp="1"/>
+          </p:cNvSpPr>
+          <p:nvPr>
+            <p:ph type="body" sz="half" idx="2"/>
+          </p:nvPr>
+        </p:nvSpPr>
+        <p:spPr>
+          <a:xfrm>
+            <a:off x="839788" y="1508290"/>
+            <a:ext cx="3932237" cy="1659116"/>
+          </a:xfrm>
+        </p:spPr>
+        <p:txBody>
+          <a:bodyPr/>
+          <a:lstStyle/>
+          <a:p>
+            <a:r>
+              <a:rPr lang="en-US" b="1" dirty="0">
+                <a:solidFill>
+                  <a:srgbClr val="FF6347"/>
+                </a:solidFill>
+              </a:rPr>
+              <a:t>Light Red </a:t>
+            </a:r>
+            <a:r>
+              <a:rPr lang="en-US" dirty="0"/>
+              <a:t>– states </a:t>
+            </a:r>
+            <a:r>
+              <a:rPr lang="en-US" dirty="0" smtClean="0"/>
+              <a:t>where CVS should expand </a:t>
+            </a:r>
+            <a:r>
+              <a:rPr lang="en-US" dirty="0"/>
+              <a:t>within</a:t>
+            </a:r>
+            <a:r>
+              <a:rPr lang="en-US" b="1" i="1" dirty="0" smtClean="0"/>
+              <a:t> current </a:t>
+            </a:r>
+            <a:r>
+              <a:rPr lang="en-US" dirty="0"/>
+              <a:t>cities</a:t>
+            </a:r>
+            <a:endParaRPr lang="en-US" dirty="0"/>
+          </a:p>
+          <a:p>
+            <a:r>
+              <a:rPr lang="en-US" b="1" dirty="0">
+                <a:solidFill>
+                  <a:srgbClr val="B22222"/>
+                </a:solidFill>
+              </a:rPr>
+              <a:t>Dark Red</a:t>
+            </a:r>
+            <a:r>
+              <a:rPr lang="en-US" dirty="0">
+                <a:solidFill>
+                  <a:srgbClr val="B22222"/>
+                </a:solidFill>
+              </a:rPr>
+              <a:t> </a:t>
+            </a:r>
+            <a:r>
+              <a:rPr lang="en-US" dirty="0"/>
+              <a:t>– states </a:t>
+            </a:r>
+            <a:r>
+              <a:rPr lang="en-US" dirty="0" smtClean="0"/>
+              <a:t>where CVS should expand </a:t>
+            </a:r>
+            <a:r>
+              <a:rPr lang="en-US" dirty="0"/>
+              <a:t>into</a:t>
+            </a:r>
+            <a:r>
+              <a:rPr lang="en-US" b="1" i="1" dirty="0" smtClean="0"/>
+              <a:t> new </a:t>
+            </a:r>
+            <a:r>
+              <a:rPr lang="en-US" dirty="0"/>
+              <a:t>cities</a:t>
+            </a:r>
+            <a:endParaRPr lang="en-US" dirty="0"/>
+          </a:p>
+          <a:p>
+            <a:endParaRPr lang="en-US" dirty="0"/>
+          </a:p>
+        </p:txBody>
+      </p:sp>
+      <p:sp>
+        <p:nvSpPr>
+          <p:cNvPr id="10" name="Slide Number Placeholder 9"/>
+          <p:cNvSpPr>
+            <a:spLocks noGrp="1"/>
+          </p:cNvSpPr>
+          <p:nvPr>
+            <p:ph type="sldNum" sz="quarter" idx="12"/>
+          </p:nvPr>
+        </p:nvSpPr>
+        <p:spPr/>
+        <p:txBody>
+          <a:bodyPr/>
+          <a:lstStyle/>
+          <a:p>
+            <a:fld id="{BF6D4B1F-8553-483E-A902-D322D1246890}" type="slidenum">
+              <a:rPr lang="en-US" smtClean="0"/>
+              <a:t>9</a:t>
+            </a:fld>
+            <a:endParaRPr lang="en-US"/>
+          </a:p>
+        </p:txBody>
+      </p:sp>
+      <p:grpSp>
+        <p:nvGrpSpPr>
+          <p:cNvPr id="6" name="Group 5"/>
+          <p:cNvGrpSpPr/>
+          <p:nvPr/>
+        </p:nvGrpSpPr>
+        <p:grpSpPr>
+          <a:xfrm>
+            <a:off x="1430862" y="3016577"/>
+            <a:ext cx="2905690" cy="3407789"/>
+            <a:chOff x="7886981" y="1988299"/>
+            <a:chExt cx="3466819" cy="4065880"/>
+          </a:xfrm>
+        </p:grpSpPr>
+        <p:pic>
+          <p:nvPicPr>
+            <p:cNvPr id="7" name="Picture 6"/>
+            <p:cNvPicPr>
+              <a:picLocks noChangeAspect="1"/>
+            </p:cNvPicPr>
+            <p:nvPr/>
+          </p:nvPicPr>
+          <p:blipFill>
+            <a:blip r:embed="rId2"/>
+            <a:stretch>
+              <a:fillRect/>
+            </a:stretch>
+          </p:blipFill>
+          <p:spPr>
+            <a:xfrm>
+              <a:off x="7886981" y="2357631"/>
+              <a:ext cx="3466819" cy="3696548"/>
+            </a:xfrm>
+            <a:prstGeom prst="rect">
+              <a:avLst/>
+            </a:prstGeom>
+          </p:spPr>
+        </p:pic>
+        <p:sp>
+          <p:nvSpPr>
+            <p:cNvPr id="8" name="TextBox 7"/>
+            <p:cNvSpPr txBox="1"/>
+            <p:nvPr/>
+          </p:nvSpPr>
+          <p:spPr>
+            <a:xfrm>
+              <a:off x="7886981" y="1988299"/>
+              <a:ext cx="3466819" cy="367213"/>
+            </a:xfrm>
+            <a:prstGeom prst="rect">
+              <a:avLst/>
+            </a:prstGeom>
+            <a:solidFill>
+              <a:schemeClr val="bg1"/>
+            </a:solidFill>
+          </p:spPr>
+          <p:txBody>
+            <a:bodyPr wrap="square" rtlCol="0">
+              <a:spAutoFit/>
+            </a:bodyPr>
+            <a:lstStyle/>
+            <a:p>
+              <a:pPr algn="ctr"/>
+              <a:r>
+                <a:rPr lang="en-US" sz="1400" u="sng" dirty="0" smtClean="0"/>
+                <a:t>Top Cities for Store Expansion</a:t>
+              </a:r>
+              <a:endParaRPr lang="en-US" sz="1400" u="sng" dirty="0"/>
+            </a:p>
+          </p:txBody>
+        </p:sp>
+        <p:sp>
+          <p:nvSpPr>
+            <p:cNvPr id="9" name="TextBox 8"/>
+            <p:cNvSpPr txBox="1"/>
+            <p:nvPr/>
+          </p:nvSpPr>
+          <p:spPr>
+            <a:xfrm>
+              <a:off x="10053320" y="2323888"/>
+              <a:ext cx="1300480" cy="312130"/>
+            </a:xfrm>
+            <a:prstGeom prst="rect">
+              <a:avLst/>
+            </a:prstGeom>
+            <a:solidFill>
+              <a:schemeClr val="bg1"/>
+            </a:solidFill>
+          </p:spPr>
+          <p:txBody>
+            <a:bodyPr wrap="square" rtlCol="0">
+              <a:spAutoFit/>
+            </a:bodyPr>
+            <a:lstStyle/>
+            <a:p>
+              <a:pPr algn="ctr"/>
+              <a:r>
+                <a:rPr lang="en-US" sz="1050" b="1" dirty="0" smtClean="0"/>
+                <a:t>Store Demand</a:t>
+              </a:r>
+              <a:endParaRPr lang="en-US" sz="1050" b="1" dirty="0"/>
+            </a:p>
+          </p:txBody>
+        </p:sp>
+      </p:grpSp>
+      <p:sp>
+        <p:nvSpPr>
+          <p:cNvPr id="11" name="Rectangle 10"/>
+          <p:cNvSpPr/>
+          <p:nvPr/>
+        </p:nvSpPr>
+        <p:spPr>
+          <a:xfrm>
+            <a:off x="1414021" y="3556498"/>
+            <a:ext cx="2916512" cy="270784"/>
           </a:xfrm>
           <a:prstGeom prst="rect">
             <a:avLst/>
           </a:prstGeom>
+          <a:noFill/>
+          <a:ln w="28575">
+            <a:solidFill>
+              <a:srgbClr val="FF6347"/>
+            </a:solidFill>
+          </a:ln>
         </p:spPr>
-      </p:pic>
+        <p:style>
+          <a:lnRef idx="2">
+            <a:schemeClr val="accent1">
+              <a:shade val="50000"/>
+            </a:schemeClr>
+          </a:lnRef>
+          <a:fillRef idx="1">
+            <a:schemeClr val="accent1"/>
+          </a:fillRef>
+          <a:effectRef idx="0">
+            <a:schemeClr val="accent1"/>
+          </a:effectRef>
+          <a:fontRef idx="minor">
+            <a:schemeClr val="lt1"/>
+          </a:fontRef>
+        </p:style>
+        <p:txBody>
+          <a:bodyPr rtlCol="0" anchor="ctr"/>
+          <a:lstStyle/>
+          <a:p>
+            <a:pPr algn="ctr"/>
+            <a:endParaRPr lang="en-US"/>
+          </a:p>
+        </p:txBody>
+      </p:sp>
+      <p:sp>
+        <p:nvSpPr>
+          <p:cNvPr id="12" name="Rectangle 11"/>
+          <p:cNvSpPr/>
+          <p:nvPr/>
+        </p:nvSpPr>
+        <p:spPr>
+          <a:xfrm>
+            <a:off x="1414021" y="4493758"/>
+            <a:ext cx="2916512" cy="270784"/>
+          </a:xfrm>
+          <a:prstGeom prst="rect">
+            <a:avLst/>
+          </a:prstGeom>
+          <a:noFill/>
+          <a:ln w="28575">
+            <a:solidFill>
+              <a:srgbClr val="FF6347"/>
+            </a:solidFill>
+          </a:ln>
+        </p:spPr>
+        <p:style>
+          <a:lnRef idx="2">
+            <a:schemeClr val="accent1">
+              <a:shade val="50000"/>
+            </a:schemeClr>
+          </a:lnRef>
+          <a:fillRef idx="1">
+            <a:schemeClr val="accent1"/>
+          </a:fillRef>
+          <a:effectRef idx="0">
+            <a:schemeClr val="accent1"/>
+          </a:effectRef>
+          <a:fontRef idx="minor">
+            <a:schemeClr val="lt1"/>
+          </a:fontRef>
+        </p:style>
+        <p:txBody>
+          <a:bodyPr rtlCol="0" anchor="ctr"/>
+          <a:lstStyle/>
+          <a:p>
+            <a:pPr algn="ctr"/>
+            <a:endParaRPr lang="en-US"/>
+          </a:p>
+        </p:txBody>
+      </p:sp>
+      <p:sp>
+        <p:nvSpPr>
+          <p:cNvPr id="13" name="Rectangle 12"/>
+          <p:cNvSpPr/>
+          <p:nvPr/>
+        </p:nvSpPr>
+        <p:spPr>
+          <a:xfrm>
+            <a:off x="1414021" y="5217658"/>
+            <a:ext cx="2916512" cy="270784"/>
+          </a:xfrm>
+          <a:prstGeom prst="rect">
+            <a:avLst/>
+          </a:prstGeom>
+          <a:noFill/>
+          <a:ln w="28575">
+            <a:solidFill>
+              <a:srgbClr val="FF6347"/>
+            </a:solidFill>
+          </a:ln>
+        </p:spPr>
+        <p:style>
+          <a:lnRef idx="2">
+            <a:schemeClr val="accent1">
+              <a:shade val="50000"/>
+            </a:schemeClr>
+          </a:lnRef>
+          <a:fillRef idx="1">
+            <a:schemeClr val="accent1"/>
+          </a:fillRef>
+          <a:effectRef idx="0">
+            <a:schemeClr val="accent1"/>
+          </a:effectRef>
+          <a:fontRef idx="minor">
+            <a:schemeClr val="lt1"/>
+          </a:fontRef>
+        </p:style>
+        <p:txBody>
+          <a:bodyPr rtlCol="0" anchor="ctr"/>
+          <a:lstStyle/>
+          <a:p>
+            <a:pPr algn="ctr"/>
+            <a:endParaRPr lang="en-US"/>
+          </a:p>
+        </p:txBody>
+      </p:sp>
+      <p:sp>
+        <p:nvSpPr>
+          <p:cNvPr id="14" name="Rectangle 13"/>
+          <p:cNvSpPr/>
+          <p:nvPr/>
+        </p:nvSpPr>
+        <p:spPr>
+          <a:xfrm>
+            <a:off x="1414021" y="5933938"/>
+            <a:ext cx="2916512" cy="270784"/>
+          </a:xfrm>
+          <a:prstGeom prst="rect">
+            <a:avLst/>
+          </a:prstGeom>
+          <a:noFill/>
+          <a:ln w="28575">
+            <a:solidFill>
+              <a:srgbClr val="FF6347"/>
+            </a:solidFill>
+          </a:ln>
+        </p:spPr>
+        <p:style>
+          <a:lnRef idx="2">
+            <a:schemeClr val="accent1">
+              <a:shade val="50000"/>
+            </a:schemeClr>
+          </a:lnRef>
+          <a:fillRef idx="1">
+            <a:schemeClr val="accent1"/>
+          </a:fillRef>
+          <a:effectRef idx="0">
+            <a:schemeClr val="accent1"/>
+          </a:effectRef>
+          <a:fontRef idx="minor">
+            <a:schemeClr val="lt1"/>
+          </a:fontRef>
+        </p:style>
+        <p:txBody>
+          <a:bodyPr rtlCol="0" anchor="ctr"/>
+          <a:lstStyle/>
+          <a:p>
+            <a:pPr algn="ctr"/>
+            <a:endParaRPr lang="en-US"/>
+          </a:p>
+        </p:txBody>
+      </p:sp>
       <p:pic>
         <p:nvPicPr>
-          <p:cNvPr id="7" name="Picture 6"/>
+          <p:cNvPr id="15" name="Picture 14"/>
           <p:cNvPicPr>
             <a:picLocks noChangeAspect="1"/>
           </p:cNvPicPr>
@@ -5403,103 +6021,14 @@
         </p:blipFill>
         <p:spPr>
           <a:xfrm>
-            <a:off x="7886981" y="2357631"/>
-            <a:ext cx="3466819" cy="3696548"/>
+            <a:off x="5363099" y="1008667"/>
+            <a:ext cx="6219420" cy="4934697"/>
           </a:xfrm>
           <a:prstGeom prst="rect">
             <a:avLst/>
           </a:prstGeom>
         </p:spPr>
       </p:pic>
-      <p:sp>
-        <p:nvSpPr>
-          <p:cNvPr id="8" name="TextBox 7"/>
-          <p:cNvSpPr txBox="1"/>
-          <p:nvPr/>
-        </p:nvSpPr>
-        <p:spPr>
-          <a:xfrm>
-            <a:off x="7886981" y="1988299"/>
-            <a:ext cx="3466819" cy="369332"/>
-          </a:xfrm>
-          <a:prstGeom prst="rect">
-            <a:avLst/>
-          </a:prstGeom>
-          <a:solidFill>
-            <a:schemeClr val="bg1"/>
-          </a:solidFill>
-        </p:spPr>
-        <p:txBody>
-          <a:bodyPr wrap="square" rtlCol="0">
-            <a:spAutoFit/>
-          </a:bodyPr>
-          <a:lstStyle/>
-          <a:p>
-            <a:pPr algn="ctr"/>
-            <a:r>
-              <a:rPr lang="en-US" u="sng" dirty="0" smtClean="0"/>
-              <a:t>Top Cities for Store Expansion</a:t>
-            </a:r>
-            <a:endParaRPr lang="en-US" u="sng" dirty="0"/>
-          </a:p>
-        </p:txBody>
-      </p:sp>
-      <p:sp>
-        <p:nvSpPr>
-          <p:cNvPr id="9" name="TextBox 8"/>
-          <p:cNvSpPr txBox="1"/>
-          <p:nvPr/>
-        </p:nvSpPr>
-        <p:spPr>
-          <a:xfrm>
-            <a:off x="10053320" y="2357631"/>
-            <a:ext cx="1300480" cy="276999"/>
-          </a:xfrm>
-          <a:prstGeom prst="rect">
-            <a:avLst/>
-          </a:prstGeom>
-          <a:solidFill>
-            <a:schemeClr val="bg1"/>
-          </a:solidFill>
-        </p:spPr>
-        <p:txBody>
-          <a:bodyPr wrap="square" rtlCol="0">
-            <a:spAutoFit/>
-          </a:bodyPr>
-          <a:lstStyle/>
-          <a:p>
-            <a:pPr algn="ctr"/>
-            <a:r>
-              <a:rPr lang="en-US" sz="1200" b="1" dirty="0" smtClean="0"/>
-              <a:t>store_demand</a:t>
-            </a:r>
-            <a:endParaRPr lang="en-US" sz="1200" b="1" dirty="0"/>
-          </a:p>
-        </p:txBody>
-      </p:sp>
-      <p:sp>
-        <p:nvSpPr>
-          <p:cNvPr id="10" name="Slide Number Placeholder 9"/>
-          <p:cNvSpPr>
-            <a:spLocks noGrp="1"/>
-          </p:cNvSpPr>
-          <p:nvPr>
-            <p:ph type="sldNum" sz="quarter" idx="12"/>
-          </p:nvPr>
-        </p:nvSpPr>
-        <p:spPr/>
-        <p:txBody>
-          <a:bodyPr/>
-          <a:lstStyle/>
-          <a:p>
-            <a:fld id="{BF6D4B1F-8553-483E-A902-D322D1246890}" type="slidenum">
-              <a:rPr lang="en-US" smtClean="0"/>
-              <a:t>9</a:t>
-            </a:fld>
-            <a:endParaRPr lang="en-US"/>
-          </a:p>
-        </p:txBody>
-      </p:sp>
     </p:spTree>
     <p:extLst>
       <p:ext uri="{BB962C8B-B14F-4D97-AF65-F5344CB8AC3E}">

</xml_diff>